<commit_message>
updates preparing for Day 2
</commit_message>
<xml_diff>
--- a/Presentatie/Programma en Leerdoelen.pptx
+++ b/Presentatie/Programma en Leerdoelen.pptx
@@ -228,7 +228,7 @@
           <a:p>
             <a:fld id="{4FDA5BBF-9A9E-E34C-87D2-CD6D1CA60245}" type="datetime1">
               <a:rPr lang="en-US" smtClean="0"/>
-              <a:t>10/31/2017</a:t>
+              <a:t>11/8/2017</a:t>
             </a:fld>
             <a:endParaRPr lang="en-US" dirty="0"/>
           </a:p>
@@ -394,7 +394,7 @@
           <a:p>
             <a:fld id="{FE5FB5CF-D153-1544-8329-2FC1F4ABF24D}" type="datetime1">
               <a:rPr lang="en-US" smtClean="0"/>
-              <a:t>10/31/2017</a:t>
+              <a:t>11/8/2017</a:t>
             </a:fld>
             <a:endParaRPr lang="nl-NL" dirty="0"/>
           </a:p>
@@ -1011,7 +1011,53 @@
           <a:p>
             <a:r>
               <a:rPr lang="en-US" dirty="0" smtClean="0"/>
-              <a:t>Docker 102: </a:t>
+              <a:t>Recap:</a:t>
+            </a:r>
+          </a:p>
+          <a:p>
+            <a:pPr marL="171450" indent="-171450">
+              <a:buFontTx/>
+              <a:buChar char="-"/>
+            </a:pPr>
+            <a:r>
+              <a:rPr lang="en-US" dirty="0" err="1" smtClean="0"/>
+              <a:t>docker</a:t>
+            </a:r>
+            <a:r>
+              <a:rPr lang="en-US" dirty="0" smtClean="0"/>
+              <a:t> 101 highlights</a:t>
+            </a:r>
+          </a:p>
+          <a:p>
+            <a:pPr marL="171450" indent="-171450">
+              <a:buFontTx/>
+              <a:buChar char="-"/>
+            </a:pPr>
+            <a:r>
+              <a:rPr lang="en-US" dirty="0" err="1" smtClean="0"/>
+              <a:t>microservices</a:t>
+            </a:r>
+            <a:r>
+              <a:rPr lang="en-US" baseline="0" dirty="0" smtClean="0"/>
+              <a:t> </a:t>
+            </a:r>
+            <a:r>
+              <a:rPr lang="en-US" baseline="0" smtClean="0"/>
+              <a:t>101 highlights</a:t>
+            </a:r>
+            <a:endParaRPr lang="en-US" dirty="0" smtClean="0"/>
+          </a:p>
+          <a:p>
+            <a:endParaRPr lang="en-US" dirty="0" smtClean="0"/>
+          </a:p>
+          <a:p>
+            <a:r>
+              <a:rPr lang="en-US" dirty="0" smtClean="0"/>
+              <a:t>Docker </a:t>
+            </a:r>
+            <a:r>
+              <a:rPr lang="en-US" dirty="0" smtClean="0"/>
+              <a:t>102: </a:t>
             </a:r>
             <a:r>
               <a:rPr lang="en-US" dirty="0" err="1" smtClean="0"/>
@@ -1241,7 +1287,7 @@
           <a:p>
             <a:fld id="{69E2E37C-AA1E-43B2-B213-E688D587CE49}" type="datetime4">
               <a:rPr lang="nl-NL" smtClean="0"/>
-              <a:t>31 oktober 2017</a:t>
+              <a:t>8 november 2017</a:t>
             </a:fld>
             <a:endParaRPr lang="nl-NL" dirty="0"/>
           </a:p>
@@ -1366,7 +1412,7 @@
           <a:p>
             <a:fld id="{96BF97C2-7262-427C-9F3E-B0D6D33F54E2}" type="datetime4">
               <a:rPr lang="nl-NL" smtClean="0"/>
-              <a:t>31 oktober 2017</a:t>
+              <a:t>8 november 2017</a:t>
             </a:fld>
             <a:endParaRPr lang="nl-NL" dirty="0"/>
           </a:p>
@@ -1597,7 +1643,7 @@
           <a:p>
             <a:fld id="{AB63B3A2-628B-479E-BF05-5959017C6A02}" type="datetime4">
               <a:rPr lang="nl-NL" smtClean="0"/>
-              <a:t>31 oktober 2017</a:t>
+              <a:t>8 november 2017</a:t>
             </a:fld>
             <a:endParaRPr lang="nl-NL" dirty="0"/>
           </a:p>
@@ -1873,7 +1919,7 @@
             <a:fld id="{249B52C1-75DC-496B-AF3F-4978B95BB865}" type="datetime4">
               <a:rPr lang="nl-NL" smtClean="0"/>
               <a:pPr/>
-              <a:t>31 oktober 2017</a:t>
+              <a:t>8 november 2017</a:t>
             </a:fld>
             <a:endParaRPr lang="nl-NL" dirty="0"/>
           </a:p>
@@ -1976,7 +2022,7 @@
           <a:p>
             <a:fld id="{8D31B592-DB5E-43FC-B016-67E26C01643F}" type="datetime4">
               <a:rPr lang="nl-NL" smtClean="0"/>
-              <a:t>31 oktober 2017</a:t>
+              <a:t>8 november 2017</a:t>
             </a:fld>
             <a:endParaRPr lang="nl-NL" dirty="0"/>
           </a:p>
@@ -2195,7 +2241,7 @@
           <a:p>
             <a:fld id="{92E94904-3BB7-4874-AB8B-F31F00F8A078}" type="datetime4">
               <a:rPr lang="nl-NL" smtClean="0"/>
-              <a:t>31 oktober 2017</a:t>
+              <a:t>8 november 2017</a:t>
             </a:fld>
             <a:endParaRPr lang="nl-NL" dirty="0"/>
           </a:p>
@@ -2384,7 +2430,7 @@
           <a:p>
             <a:fld id="{A9642D5E-8E53-4D94-8479-CCF9387ED904}" type="datetime4">
               <a:rPr lang="nl-NL" smtClean="0"/>
-              <a:t>31 oktober 2017</a:t>
+              <a:t>8 november 2017</a:t>
             </a:fld>
             <a:endParaRPr lang="nl-NL" dirty="0"/>
           </a:p>
@@ -2608,7 +2654,7 @@
           <a:p>
             <a:fld id="{87D76D0B-AA25-481F-9FCE-BD155C5A6085}" type="datetime4">
               <a:rPr lang="nl-NL" smtClean="0"/>
-              <a:t>31 oktober 2017</a:t>
+              <a:t>8 november 2017</a:t>
             </a:fld>
             <a:endParaRPr lang="nl-NL" dirty="0"/>
           </a:p>
@@ -2828,7 +2874,7 @@
           <a:p>
             <a:fld id="{88C11819-B839-4C27-8B45-7170CEF46D62}" type="datetime4">
               <a:rPr lang="nl-NL" smtClean="0"/>
-              <a:t>31 oktober 2017</a:t>
+              <a:t>8 november 2017</a:t>
             </a:fld>
             <a:endParaRPr lang="nl-NL" dirty="0"/>
           </a:p>
@@ -3051,7 +3097,7 @@
           <a:p>
             <a:fld id="{174613E7-29CA-4C1D-88BD-FA51696C19FE}" type="datetime4">
               <a:rPr lang="nl-NL" smtClean="0"/>
-              <a:t>31 oktober 2017</a:t>
+              <a:t>8 november 2017</a:t>
             </a:fld>
             <a:endParaRPr lang="nl-NL" dirty="0"/>
           </a:p>
@@ -3251,7 +3297,7 @@
           <a:p>
             <a:fld id="{9F389A9C-5452-4AF4-8D69-2209042ED2AB}" type="datetime4">
               <a:rPr lang="nl-NL" smtClean="0"/>
-              <a:t>31 oktober 2017</a:t>
+              <a:t>8 november 2017</a:t>
             </a:fld>
             <a:endParaRPr lang="nl-NL" dirty="0"/>
           </a:p>
@@ -3462,7 +3508,7 @@
           <a:p>
             <a:fld id="{59ABBC3E-A20C-4DEE-9D7A-437B797B148A}" type="datetime4">
               <a:rPr lang="nl-NL" smtClean="0"/>
-              <a:t>31 oktober 2017</a:t>
+              <a:t>8 november 2017</a:t>
             </a:fld>
             <a:r>
               <a:rPr lang="en-US" smtClean="0"/>
@@ -4007,7 +4053,7 @@
           <a:p>
             <a:fld id="{E8809DAD-F941-4A15-ABB1-44FA32742BE9}" type="datetime4">
               <a:rPr lang="nl-NL" smtClean="0"/>
-              <a:t>31 oktober 2017</a:t>
+              <a:t>8 november 2017</a:t>
             </a:fld>
             <a:endParaRPr lang="nl-NL" dirty="0"/>
           </a:p>
@@ -4209,7 +4255,7 @@
                   <a:srgbClr val="009036"/>
                 </a:solidFill>
               </a:rPr>
-              <a:t>31 oktober 2017</a:t>
+              <a:t>8 november 2017</a:t>
             </a:fld>
             <a:endParaRPr lang="nl-NL" sz="900" cap="all" dirty="0">
               <a:solidFill>
@@ -4504,7 +4550,7 @@
                   <a:srgbClr val="009036"/>
                 </a:solidFill>
               </a:rPr>
-              <a:t>31 oktober 2017</a:t>
+              <a:t>8 november 2017</a:t>
             </a:fld>
             <a:endParaRPr lang="nl-NL" sz="900" cap="all" dirty="0">
               <a:solidFill>
@@ -4691,7 +4737,7 @@
                 </a:solidFill>
               </a:rPr>
               <a:pPr/>
-              <a:t>31 oktober 2017</a:t>
+              <a:t>8 november 2017</a:t>
             </a:fld>
             <a:endParaRPr lang="nl-NL" sz="900" cap="all" dirty="0">
               <a:solidFill>
@@ -4821,14 +4867,13 @@
             </a:r>
             <a:r>
               <a:rPr lang="nl-NL" dirty="0" smtClean="0"/>
-              <a:t> dag 1</a:t>
-            </a:r>
-          </a:p>
-          <a:p>
-            <a:r>
-              <a:rPr lang="nl-NL" dirty="0" smtClean="0"/>
-              <a:t>Introductie</a:t>
-            </a:r>
+              <a:t> dag </a:t>
+            </a:r>
+            <a:r>
+              <a:rPr lang="nl-NL" dirty="0" smtClean="0"/>
+              <a:t>1</a:t>
+            </a:r>
+            <a:endParaRPr lang="nl-NL" dirty="0" smtClean="0"/>
           </a:p>
           <a:p>
             <a:r>
@@ -4904,7 +4949,7 @@
                 </a:solidFill>
               </a:rPr>
               <a:pPr/>
-              <a:t>31 oktober 2017</a:t>
+              <a:t>8 november 2017</a:t>
             </a:fld>
             <a:endParaRPr lang="nl-NL" sz="900" cap="all" dirty="0">
               <a:solidFill>
@@ -5864,21 +5909,6 @@
 </file>
 
 <file path=customXml/item1.xml><?xml version="1.0" encoding="utf-8"?>
-<?mso-contentType ?>
-<FormTemplates xmlns="http://schemas.microsoft.com/sharepoint/v3/contenttype/forms">
-  <Display>DocumentLibraryForm</Display>
-  <Edit>DocumentLibraryForm</Edit>
-  <New>DocumentLibraryForm</New>
-</FormTemplates>
-</file>
-
-<file path=customXml/item2.xml><?xml version="1.0" encoding="utf-8"?>
-<p:properties xmlns:p="http://schemas.microsoft.com/office/2006/metadata/properties" xmlns:xsi="http://www.w3.org/2001/XMLSchema-instance" xmlns:pc="http://schemas.microsoft.com/office/infopath/2007/PartnerControls">
-  <documentManagement/>
-</p:properties>
-</file>
-
-<file path=customXml/item3.xml><?xml version="1.0" encoding="utf-8"?>
 <ct:contentTypeSchema xmlns:ct="http://schemas.microsoft.com/office/2006/metadata/contentType" xmlns:ma="http://schemas.microsoft.com/office/2006/metadata/properties/metaAttributes" ct:_="" ma:_="" ma:contentTypeName="Document" ma:contentTypeID="0x0101009843F10021B1B74BA5DD583B6999787F" ma:contentTypeVersion="1" ma:contentTypeDescription="Een nieuw document maken." ma:contentTypeScope="" ma:versionID="9f7dad7ca3b37095ed9229a6a072267d">
   <xsd:schema xmlns:xsd="http://www.w3.org/2001/XMLSchema" xmlns:xs="http://www.w3.org/2001/XMLSchema" xmlns:p="http://schemas.microsoft.com/office/2006/metadata/properties" targetNamespace="http://schemas.microsoft.com/office/2006/metadata/properties" ma:root="true" ma:fieldsID="a17e5968c79d9fe2fc9f8835eee23f58">
     <xsd:element name="properties">
@@ -5992,10 +6022,33 @@
 </ct:contentTypeSchema>
 </file>
 
+<file path=customXml/item2.xml><?xml version="1.0" encoding="utf-8"?>
+<p:properties xmlns:p="http://schemas.microsoft.com/office/2006/metadata/properties" xmlns:xsi="http://www.w3.org/2001/XMLSchema-instance" xmlns:pc="http://schemas.microsoft.com/office/infopath/2007/PartnerControls">
+  <documentManagement/>
+</p:properties>
+</file>
+
+<file path=customXml/item3.xml><?xml version="1.0" encoding="utf-8"?>
+<?mso-contentType ?>
+<FormTemplates xmlns="http://schemas.microsoft.com/sharepoint/v3/contenttype/forms">
+  <Display>DocumentLibraryForm</Display>
+  <Edit>DocumentLibraryForm</Edit>
+  <New>DocumentLibraryForm</New>
+</FormTemplates>
+</file>
+
 <file path=customXml/itemProps1.xml><?xml version="1.0" encoding="utf-8"?>
-<ds:datastoreItem xmlns:ds="http://schemas.openxmlformats.org/officeDocument/2006/customXml" ds:itemID="{4A752D92-0ACC-48D2-A658-AB744FE70ECE}">
+<ds:datastoreItem xmlns:ds="http://schemas.openxmlformats.org/officeDocument/2006/customXml" ds:itemID="{3175F035-B069-4F0E-ADC8-454931FDE34D}">
   <ds:schemaRefs>
-    <ds:schemaRef ds:uri="http://schemas.microsoft.com/sharepoint/v3/contenttype/forms"/>
+    <ds:schemaRef ds:uri="http://schemas.microsoft.com/office/2006/metadata/contentType"/>
+    <ds:schemaRef ds:uri="http://schemas.microsoft.com/office/2006/metadata/properties/metaAttributes"/>
+    <ds:schemaRef ds:uri="http://www.w3.org/2001/XMLSchema"/>
+    <ds:schemaRef ds:uri="http://schemas.microsoft.com/office/2006/metadata/properties"/>
+    <ds:schemaRef ds:uri="http://schemas.openxmlformats.org/package/2006/metadata/core-properties"/>
+    <ds:schemaRef ds:uri="http://purl.org/dc/elements/1.1/"/>
+    <ds:schemaRef ds:uri="http://purl.org/dc/terms/"/>
+    <ds:schemaRef ds:uri="http://schemas.microsoft.com/internal/obd"/>
+    <ds:schemaRef ds:uri="http://schemas.microsoft.com/office/infopath/2007/PartnerControls"/>
   </ds:schemaRefs>
 </ds:datastoreItem>
 </file>
@@ -6016,17 +6069,9 @@
 </file>
 
 <file path=customXml/itemProps3.xml><?xml version="1.0" encoding="utf-8"?>
-<ds:datastoreItem xmlns:ds="http://schemas.openxmlformats.org/officeDocument/2006/customXml" ds:itemID="{3175F035-B069-4F0E-ADC8-454931FDE34D}">
+<ds:datastoreItem xmlns:ds="http://schemas.openxmlformats.org/officeDocument/2006/customXml" ds:itemID="{4A752D92-0ACC-48D2-A658-AB744FE70ECE}">
   <ds:schemaRefs>
-    <ds:schemaRef ds:uri="http://schemas.microsoft.com/office/2006/metadata/contentType"/>
-    <ds:schemaRef ds:uri="http://schemas.microsoft.com/office/2006/metadata/properties/metaAttributes"/>
-    <ds:schemaRef ds:uri="http://www.w3.org/2001/XMLSchema"/>
-    <ds:schemaRef ds:uri="http://schemas.microsoft.com/office/2006/metadata/properties"/>
-    <ds:schemaRef ds:uri="http://schemas.openxmlformats.org/package/2006/metadata/core-properties"/>
-    <ds:schemaRef ds:uri="http://purl.org/dc/elements/1.1/"/>
-    <ds:schemaRef ds:uri="http://purl.org/dc/terms/"/>
-    <ds:schemaRef ds:uri="http://schemas.microsoft.com/internal/obd"/>
-    <ds:schemaRef ds:uri="http://schemas.microsoft.com/office/infopath/2007/PartnerControls"/>
+    <ds:schemaRef ds:uri="http://schemas.microsoft.com/sharepoint/v3/contenttype/forms"/>
   </ds:schemaRefs>
 </ds:datastoreItem>
 </file>
</xml_diff>

<commit_message>
Presentielijst, Feedback en correcte instructie Opdracht 2
</commit_message>
<xml_diff>
--- a/Presentatie/Programma en Leerdoelen.pptx
+++ b/Presentatie/Programma en Leerdoelen.pptx
@@ -228,7 +228,7 @@
           <a:p>
             <a:fld id="{4FDA5BBF-9A9E-E34C-87D2-CD6D1CA60245}" type="datetime1">
               <a:rPr lang="en-US" smtClean="0"/>
-              <a:t>11/8/2017</a:t>
+              <a:t>11/14/2017</a:t>
             </a:fld>
             <a:endParaRPr lang="en-US" dirty="0"/>
           </a:p>
@@ -394,7 +394,7 @@
           <a:p>
             <a:fld id="{FE5FB5CF-D153-1544-8329-2FC1F4ABF24D}" type="datetime1">
               <a:rPr lang="en-US" smtClean="0"/>
-              <a:t>11/8/2017</a:t>
+              <a:t>11/14/2017</a:t>
             </a:fld>
             <a:endParaRPr lang="nl-NL" dirty="0"/>
           </a:p>
@@ -1053,11 +1053,7 @@
           <a:p>
             <a:r>
               <a:rPr lang="en-US" dirty="0" smtClean="0"/>
-              <a:t>Docker </a:t>
-            </a:r>
-            <a:r>
-              <a:rPr lang="en-US" dirty="0" smtClean="0"/>
-              <a:t>102: </a:t>
+              <a:t>Docker 102: </a:t>
             </a:r>
             <a:r>
               <a:rPr lang="en-US" dirty="0" err="1" smtClean="0"/>
@@ -1287,7 +1283,7 @@
           <a:p>
             <a:fld id="{69E2E37C-AA1E-43B2-B213-E688D587CE49}" type="datetime4">
               <a:rPr lang="nl-NL" smtClean="0"/>
-              <a:t>8 november 2017</a:t>
+              <a:t>14 november 2017</a:t>
             </a:fld>
             <a:endParaRPr lang="nl-NL" dirty="0"/>
           </a:p>
@@ -1412,7 +1408,7 @@
           <a:p>
             <a:fld id="{96BF97C2-7262-427C-9F3E-B0D6D33F54E2}" type="datetime4">
               <a:rPr lang="nl-NL" smtClean="0"/>
-              <a:t>8 november 2017</a:t>
+              <a:t>14 november 2017</a:t>
             </a:fld>
             <a:endParaRPr lang="nl-NL" dirty="0"/>
           </a:p>
@@ -1643,7 +1639,7 @@
           <a:p>
             <a:fld id="{AB63B3A2-628B-479E-BF05-5959017C6A02}" type="datetime4">
               <a:rPr lang="nl-NL" smtClean="0"/>
-              <a:t>8 november 2017</a:t>
+              <a:t>14 november 2017</a:t>
             </a:fld>
             <a:endParaRPr lang="nl-NL" dirty="0"/>
           </a:p>
@@ -1919,7 +1915,7 @@
             <a:fld id="{249B52C1-75DC-496B-AF3F-4978B95BB865}" type="datetime4">
               <a:rPr lang="nl-NL" smtClean="0"/>
               <a:pPr/>
-              <a:t>8 november 2017</a:t>
+              <a:t>14 november 2017</a:t>
             </a:fld>
             <a:endParaRPr lang="nl-NL" dirty="0"/>
           </a:p>
@@ -2022,7 +2018,7 @@
           <a:p>
             <a:fld id="{8D31B592-DB5E-43FC-B016-67E26C01643F}" type="datetime4">
               <a:rPr lang="nl-NL" smtClean="0"/>
-              <a:t>8 november 2017</a:t>
+              <a:t>14 november 2017</a:t>
             </a:fld>
             <a:endParaRPr lang="nl-NL" dirty="0"/>
           </a:p>
@@ -2241,7 +2237,7 @@
           <a:p>
             <a:fld id="{92E94904-3BB7-4874-AB8B-F31F00F8A078}" type="datetime4">
               <a:rPr lang="nl-NL" smtClean="0"/>
-              <a:t>8 november 2017</a:t>
+              <a:t>14 november 2017</a:t>
             </a:fld>
             <a:endParaRPr lang="nl-NL" dirty="0"/>
           </a:p>
@@ -2430,7 +2426,7 @@
           <a:p>
             <a:fld id="{A9642D5E-8E53-4D94-8479-CCF9387ED904}" type="datetime4">
               <a:rPr lang="nl-NL" smtClean="0"/>
-              <a:t>8 november 2017</a:t>
+              <a:t>14 november 2017</a:t>
             </a:fld>
             <a:endParaRPr lang="nl-NL" dirty="0"/>
           </a:p>
@@ -2654,7 +2650,7 @@
           <a:p>
             <a:fld id="{87D76D0B-AA25-481F-9FCE-BD155C5A6085}" type="datetime4">
               <a:rPr lang="nl-NL" smtClean="0"/>
-              <a:t>8 november 2017</a:t>
+              <a:t>14 november 2017</a:t>
             </a:fld>
             <a:endParaRPr lang="nl-NL" dirty="0"/>
           </a:p>
@@ -2874,7 +2870,7 @@
           <a:p>
             <a:fld id="{88C11819-B839-4C27-8B45-7170CEF46D62}" type="datetime4">
               <a:rPr lang="nl-NL" smtClean="0"/>
-              <a:t>8 november 2017</a:t>
+              <a:t>14 november 2017</a:t>
             </a:fld>
             <a:endParaRPr lang="nl-NL" dirty="0"/>
           </a:p>
@@ -3097,7 +3093,7 @@
           <a:p>
             <a:fld id="{174613E7-29CA-4C1D-88BD-FA51696C19FE}" type="datetime4">
               <a:rPr lang="nl-NL" smtClean="0"/>
-              <a:t>8 november 2017</a:t>
+              <a:t>14 november 2017</a:t>
             </a:fld>
             <a:endParaRPr lang="nl-NL" dirty="0"/>
           </a:p>
@@ -3297,7 +3293,7 @@
           <a:p>
             <a:fld id="{9F389A9C-5452-4AF4-8D69-2209042ED2AB}" type="datetime4">
               <a:rPr lang="nl-NL" smtClean="0"/>
-              <a:t>8 november 2017</a:t>
+              <a:t>14 november 2017</a:t>
             </a:fld>
             <a:endParaRPr lang="nl-NL" dirty="0"/>
           </a:p>
@@ -3508,7 +3504,7 @@
           <a:p>
             <a:fld id="{59ABBC3E-A20C-4DEE-9D7A-437B797B148A}" type="datetime4">
               <a:rPr lang="nl-NL" smtClean="0"/>
-              <a:t>8 november 2017</a:t>
+              <a:t>14 november 2017</a:t>
             </a:fld>
             <a:r>
               <a:rPr lang="en-US" smtClean="0"/>
@@ -4053,7 +4049,7 @@
           <a:p>
             <a:fld id="{E8809DAD-F941-4A15-ABB1-44FA32742BE9}" type="datetime4">
               <a:rPr lang="nl-NL" smtClean="0"/>
-              <a:t>8 november 2017</a:t>
+              <a:t>14 november 2017</a:t>
             </a:fld>
             <a:endParaRPr lang="nl-NL" dirty="0"/>
           </a:p>
@@ -4255,7 +4251,7 @@
                   <a:srgbClr val="009036"/>
                 </a:solidFill>
               </a:rPr>
-              <a:t>8 november 2017</a:t>
+              <a:t>14 november 2017</a:t>
             </a:fld>
             <a:endParaRPr lang="nl-NL" sz="900" cap="all" dirty="0">
               <a:solidFill>
@@ -4550,7 +4546,7 @@
                   <a:srgbClr val="009036"/>
                 </a:solidFill>
               </a:rPr>
-              <a:t>8 november 2017</a:t>
+              <a:t>14 november 2017</a:t>
             </a:fld>
             <a:endParaRPr lang="nl-NL" sz="900" cap="all" dirty="0">
               <a:solidFill>
@@ -4737,7 +4733,7 @@
                 </a:solidFill>
               </a:rPr>
               <a:pPr/>
-              <a:t>8 november 2017</a:t>
+              <a:t>14 november 2017</a:t>
             </a:fld>
             <a:endParaRPr lang="nl-NL" sz="900" cap="all" dirty="0">
               <a:solidFill>
@@ -4867,54 +4863,38 @@
             </a:r>
             <a:r>
               <a:rPr lang="nl-NL" dirty="0" smtClean="0"/>
-              <a:t> dag </a:t>
-            </a:r>
-            <a:r>
-              <a:rPr lang="nl-NL" dirty="0" smtClean="0"/>
-              <a:t>1</a:t>
+              <a:t> dag 1</a:t>
+            </a:r>
+          </a:p>
+          <a:p>
+            <a:r>
+              <a:rPr lang="nl-NL" dirty="0" smtClean="0"/>
+              <a:t>Microservices </a:t>
+            </a:r>
+            <a:r>
+              <a:rPr lang="nl-NL" dirty="0" smtClean="0"/>
+              <a:t>102</a:t>
             </a:r>
             <a:endParaRPr lang="nl-NL" dirty="0" smtClean="0"/>
           </a:p>
           <a:p>
             <a:r>
-              <a:rPr lang="nl-NL" dirty="0" smtClean="0"/>
-              <a:t>Microservices 102 (real-life casus)</a:t>
-            </a:r>
-          </a:p>
-          <a:p>
-            <a:r>
-              <a:rPr lang="nl-NL" dirty="0" err="1" smtClean="0"/>
-              <a:t>Docker</a:t>
-            </a:r>
-            <a:r>
-              <a:rPr lang="nl-NL" dirty="0" smtClean="0"/>
-              <a:t> </a:t>
+              <a:rPr lang="nl-NL" smtClean="0"/>
+              <a:t>Docker </a:t>
+            </a:r>
+            <a:r>
+              <a:rPr lang="nl-NL" smtClean="0"/>
+              <a:t>102</a:t>
+            </a:r>
+          </a:p>
+          <a:p>
+            <a:r>
+              <a:rPr lang="nl-NL" dirty="0" smtClean="0"/>
+              <a:t>(Real-life casus</a:t>
             </a:r>
             <a:r>
               <a:rPr lang="nl-NL" dirty="0"/>
-              <a:t>102 (OSS  en .</a:t>
-            </a:r>
-            <a:r>
-              <a:rPr lang="nl-NL" dirty="0" smtClean="0"/>
-              <a:t>Net)</a:t>
-            </a:r>
-          </a:p>
-          <a:p>
-            <a:r>
-              <a:rPr lang="nl-NL" dirty="0"/>
-              <a:t>Workshop </a:t>
-            </a:r>
-            <a:r>
-              <a:rPr lang="nl-NL" dirty="0" err="1"/>
-              <a:t>Docker</a:t>
-            </a:r>
-            <a:r>
-              <a:rPr lang="nl-NL" dirty="0"/>
-              <a:t> </a:t>
-            </a:r>
-            <a:r>
-              <a:rPr lang="nl-NL" dirty="0" smtClean="0"/>
-              <a:t>microservices</a:t>
+              <a:t>)</a:t>
             </a:r>
             <a:endParaRPr lang="nl-NL" dirty="0"/>
           </a:p>
@@ -4949,7 +4929,7 @@
                 </a:solidFill>
               </a:rPr>
               <a:pPr/>
-              <a:t>8 november 2017</a:t>
+              <a:t>14 november 2017</a:t>
             </a:fld>
             <a:endParaRPr lang="nl-NL" sz="900" cap="all" dirty="0">
               <a:solidFill>
@@ -5909,6 +5889,21 @@
 </file>
 
 <file path=customXml/item1.xml><?xml version="1.0" encoding="utf-8"?>
+<?mso-contentType ?>
+<FormTemplates xmlns="http://schemas.microsoft.com/sharepoint/v3/contenttype/forms">
+  <Display>DocumentLibraryForm</Display>
+  <Edit>DocumentLibraryForm</Edit>
+  <New>DocumentLibraryForm</New>
+</FormTemplates>
+</file>
+
+<file path=customXml/item2.xml><?xml version="1.0" encoding="utf-8"?>
+<p:properties xmlns:p="http://schemas.microsoft.com/office/2006/metadata/properties" xmlns:xsi="http://www.w3.org/2001/XMLSchema-instance" xmlns:pc="http://schemas.microsoft.com/office/infopath/2007/PartnerControls">
+  <documentManagement/>
+</p:properties>
+</file>
+
+<file path=customXml/item3.xml><?xml version="1.0" encoding="utf-8"?>
 <ct:contentTypeSchema xmlns:ct="http://schemas.microsoft.com/office/2006/metadata/contentType" xmlns:ma="http://schemas.microsoft.com/office/2006/metadata/properties/metaAttributes" ct:_="" ma:_="" ma:contentTypeName="Document" ma:contentTypeID="0x0101009843F10021B1B74BA5DD583B6999787F" ma:contentTypeVersion="1" ma:contentTypeDescription="Een nieuw document maken." ma:contentTypeScope="" ma:versionID="9f7dad7ca3b37095ed9229a6a072267d">
   <xsd:schema xmlns:xsd="http://www.w3.org/2001/XMLSchema" xmlns:xs="http://www.w3.org/2001/XMLSchema" xmlns:p="http://schemas.microsoft.com/office/2006/metadata/properties" targetNamespace="http://schemas.microsoft.com/office/2006/metadata/properties" ma:root="true" ma:fieldsID="a17e5968c79d9fe2fc9f8835eee23f58">
     <xsd:element name="properties">
@@ -6022,33 +6017,10 @@
 </ct:contentTypeSchema>
 </file>
 
-<file path=customXml/item2.xml><?xml version="1.0" encoding="utf-8"?>
-<p:properties xmlns:p="http://schemas.microsoft.com/office/2006/metadata/properties" xmlns:xsi="http://www.w3.org/2001/XMLSchema-instance" xmlns:pc="http://schemas.microsoft.com/office/infopath/2007/PartnerControls">
-  <documentManagement/>
-</p:properties>
-</file>
-
-<file path=customXml/item3.xml><?xml version="1.0" encoding="utf-8"?>
-<?mso-contentType ?>
-<FormTemplates xmlns="http://schemas.microsoft.com/sharepoint/v3/contenttype/forms">
-  <Display>DocumentLibraryForm</Display>
-  <Edit>DocumentLibraryForm</Edit>
-  <New>DocumentLibraryForm</New>
-</FormTemplates>
-</file>
-
 <file path=customXml/itemProps1.xml><?xml version="1.0" encoding="utf-8"?>
-<ds:datastoreItem xmlns:ds="http://schemas.openxmlformats.org/officeDocument/2006/customXml" ds:itemID="{3175F035-B069-4F0E-ADC8-454931FDE34D}">
+<ds:datastoreItem xmlns:ds="http://schemas.openxmlformats.org/officeDocument/2006/customXml" ds:itemID="{4A752D92-0ACC-48D2-A658-AB744FE70ECE}">
   <ds:schemaRefs>
-    <ds:schemaRef ds:uri="http://schemas.microsoft.com/office/2006/metadata/contentType"/>
-    <ds:schemaRef ds:uri="http://schemas.microsoft.com/office/2006/metadata/properties/metaAttributes"/>
-    <ds:schemaRef ds:uri="http://www.w3.org/2001/XMLSchema"/>
-    <ds:schemaRef ds:uri="http://schemas.microsoft.com/office/2006/metadata/properties"/>
-    <ds:schemaRef ds:uri="http://schemas.openxmlformats.org/package/2006/metadata/core-properties"/>
-    <ds:schemaRef ds:uri="http://purl.org/dc/elements/1.1/"/>
-    <ds:schemaRef ds:uri="http://purl.org/dc/terms/"/>
-    <ds:schemaRef ds:uri="http://schemas.microsoft.com/internal/obd"/>
-    <ds:schemaRef ds:uri="http://schemas.microsoft.com/office/infopath/2007/PartnerControls"/>
+    <ds:schemaRef ds:uri="http://schemas.microsoft.com/sharepoint/v3/contenttype/forms"/>
   </ds:schemaRefs>
 </ds:datastoreItem>
 </file>
@@ -6069,9 +6041,17 @@
 </file>
 
 <file path=customXml/itemProps3.xml><?xml version="1.0" encoding="utf-8"?>
-<ds:datastoreItem xmlns:ds="http://schemas.openxmlformats.org/officeDocument/2006/customXml" ds:itemID="{4A752D92-0ACC-48D2-A658-AB744FE70ECE}">
+<ds:datastoreItem xmlns:ds="http://schemas.openxmlformats.org/officeDocument/2006/customXml" ds:itemID="{3175F035-B069-4F0E-ADC8-454931FDE34D}">
   <ds:schemaRefs>
-    <ds:schemaRef ds:uri="http://schemas.microsoft.com/sharepoint/v3/contenttype/forms"/>
+    <ds:schemaRef ds:uri="http://schemas.microsoft.com/office/2006/metadata/contentType"/>
+    <ds:schemaRef ds:uri="http://schemas.microsoft.com/office/2006/metadata/properties/metaAttributes"/>
+    <ds:schemaRef ds:uri="http://www.w3.org/2001/XMLSchema"/>
+    <ds:schemaRef ds:uri="http://schemas.microsoft.com/office/2006/metadata/properties"/>
+    <ds:schemaRef ds:uri="http://schemas.openxmlformats.org/package/2006/metadata/core-properties"/>
+    <ds:schemaRef ds:uri="http://purl.org/dc/elements/1.1/"/>
+    <ds:schemaRef ds:uri="http://purl.org/dc/terms/"/>
+    <ds:schemaRef ds:uri="http://schemas.microsoft.com/internal/obd"/>
+    <ds:schemaRef ds:uri="http://schemas.microsoft.com/office/infopath/2007/PartnerControls"/>
   </ds:schemaRefs>
 </ds:datastoreItem>
 </file>
</xml_diff>

<commit_message>
many updates and additions
</commit_message>
<xml_diff>
--- a/Presentatie/Programma en Leerdoelen.pptx
+++ b/Presentatie/Programma en Leerdoelen.pptx
@@ -5,10 +5,10 @@
     <p:sldMasterId id="2147483648" r:id="rId4"/>
   </p:sldMasterIdLst>
   <p:notesMasterIdLst>
-    <p:notesMasterId r:id="rId10"/>
+    <p:notesMasterId r:id="rId11"/>
   </p:notesMasterIdLst>
   <p:handoutMasterIdLst>
-    <p:handoutMasterId r:id="rId11"/>
+    <p:handoutMasterId r:id="rId12"/>
   </p:handoutMasterIdLst>
   <p:sldIdLst>
     <p:sldId id="257" r:id="rId5"/>
@@ -16,6 +16,7 @@
     <p:sldId id="259" r:id="rId7"/>
     <p:sldId id="279" r:id="rId8"/>
     <p:sldId id="280" r:id="rId9"/>
+    <p:sldId id="282" r:id="rId10"/>
   </p:sldIdLst>
   <p:sldSz cx="9144000" cy="6858000" type="screen4x3"/>
   <p:notesSz cx="6858000" cy="9144000"/>
@@ -228,7 +229,7 @@
           <a:p>
             <a:fld id="{4FDA5BBF-9A9E-E34C-87D2-CD6D1CA60245}" type="datetime1">
               <a:rPr lang="en-US" smtClean="0"/>
-              <a:t>11/14/2017</a:t>
+              <a:t>10/5/2018</a:t>
             </a:fld>
             <a:endParaRPr lang="en-US" dirty="0"/>
           </a:p>
@@ -394,7 +395,7 @@
           <a:p>
             <a:fld id="{FE5FB5CF-D153-1544-8329-2FC1F4ABF24D}" type="datetime1">
               <a:rPr lang="en-US" smtClean="0"/>
-              <a:t>11/14/2017</a:t>
+              <a:t>10/5/2018</a:t>
             </a:fld>
             <a:endParaRPr lang="nl-NL" dirty="0"/>
           </a:p>
@@ -458,38 +459,37 @@
           <a:p>
             <a:pPr lvl="0"/>
             <a:r>
-              <a:rPr lang="nl-NL" smtClean="0"/>
+              <a:rPr lang="nl-NL"/>
               <a:t>Klik om de modelstijlen te bewerken</a:t>
             </a:r>
           </a:p>
           <a:p>
             <a:pPr lvl="1"/>
             <a:r>
-              <a:rPr lang="nl-NL" smtClean="0"/>
+              <a:rPr lang="nl-NL"/>
               <a:t>Tweede niveau</a:t>
             </a:r>
           </a:p>
           <a:p>
             <a:pPr lvl="2"/>
             <a:r>
-              <a:rPr lang="nl-NL" smtClean="0"/>
+              <a:rPr lang="nl-NL"/>
               <a:t>Derde niveau</a:t>
             </a:r>
           </a:p>
           <a:p>
             <a:pPr lvl="3"/>
             <a:r>
-              <a:rPr lang="nl-NL" smtClean="0"/>
+              <a:rPr lang="nl-NL"/>
               <a:t>Vierde niveau</a:t>
             </a:r>
           </a:p>
           <a:p>
             <a:pPr lvl="4"/>
             <a:r>
-              <a:rPr lang="nl-NL" smtClean="0"/>
+              <a:rPr lang="nl-NL"/>
               <a:t>Vijfde niveau</a:t>
             </a:r>
-            <a:endParaRPr lang="nl-NL"/>
           </a:p>
         </p:txBody>
       </p:sp>
@@ -707,7 +707,7 @@
           <a:bodyPr/>
           <a:lstStyle/>
           <a:p>
-            <a:endParaRPr lang="nl-NL"/>
+            <a:endParaRPr lang="nl-NL" dirty="0"/>
           </a:p>
         </p:txBody>
       </p:sp>
@@ -791,7 +791,7 @@
           <a:bodyPr/>
           <a:lstStyle/>
           <a:p>
-            <a:endParaRPr lang="en-US" baseline="0" dirty="0" smtClean="0"/>
+            <a:endParaRPr lang="en-US" baseline="0" dirty="0"/>
           </a:p>
         </p:txBody>
       </p:sp>
@@ -876,53 +876,45 @@
           <a:lstStyle/>
           <a:p>
             <a:r>
-              <a:rPr lang="en-US" dirty="0" smtClean="0"/>
+              <a:rPr lang="en-US" dirty="0"/>
               <a:t>Docker 101 </a:t>
             </a:r>
             <a:r>
-              <a:rPr lang="en-US" dirty="0" err="1" smtClean="0"/>
+              <a:rPr lang="en-US" dirty="0" err="1"/>
               <a:t>ervaring</a:t>
             </a:r>
             <a:r>
-              <a:rPr lang="en-US" dirty="0" smtClean="0"/>
+              <a:rPr lang="en-US" dirty="0"/>
               <a:t> met 1 container: build, run, debug,</a:t>
             </a:r>
             <a:r>
-              <a:rPr lang="en-US" baseline="0" dirty="0" smtClean="0"/>
+              <a:rPr lang="en-US" baseline="0" dirty="0"/>
               <a:t> push, pull</a:t>
             </a:r>
           </a:p>
           <a:p>
             <a:r>
-              <a:rPr lang="en-US" b="1" baseline="0" dirty="0" err="1" smtClean="0"/>
+              <a:rPr lang="en-US" b="1" baseline="0" dirty="0" err="1"/>
               <a:t>inclusief</a:t>
             </a:r>
             <a:r>
-              <a:rPr lang="en-US" b="0" baseline="0" dirty="0" smtClean="0"/>
-              <a:t>: </a:t>
-            </a:r>
-            <a:r>
-              <a:rPr lang="en-US" b="0" baseline="0" dirty="0" err="1" smtClean="0"/>
-              <a:t>Git</a:t>
-            </a:r>
-            <a:r>
-              <a:rPr lang="en-US" b="0" baseline="0" dirty="0" smtClean="0"/>
-              <a:t>- </a:t>
-            </a:r>
-            <a:r>
-              <a:rPr lang="en-US" b="0" baseline="0" dirty="0" err="1" smtClean="0"/>
+              <a:rPr lang="en-US" b="0" baseline="0" dirty="0"/>
+              <a:t>: Git- </a:t>
+            </a:r>
+            <a:r>
+              <a:rPr lang="en-US" b="0" baseline="0" dirty="0" err="1"/>
               <a:t>en</a:t>
             </a:r>
             <a:r>
-              <a:rPr lang="en-US" b="0" baseline="0" dirty="0" smtClean="0"/>
+              <a:rPr lang="en-US" b="0" baseline="0" dirty="0"/>
               <a:t> Docker-</a:t>
             </a:r>
             <a:r>
-              <a:rPr lang="en-US" b="0" baseline="0" dirty="0" err="1" smtClean="0"/>
+              <a:rPr lang="en-US" b="0" baseline="0" dirty="0" err="1"/>
               <a:t>installatie</a:t>
             </a:r>
             <a:r>
-              <a:rPr lang="en-US" b="0" baseline="0" smtClean="0"/>
+              <a:rPr lang="en-US" b="0" baseline="0" dirty="0"/>
               <a:t>(s)</a:t>
             </a:r>
             <a:endParaRPr lang="nl-NL" b="1" dirty="0"/>
@@ -1010,7 +1002,7 @@
           <a:lstStyle/>
           <a:p>
             <a:r>
-              <a:rPr lang="en-US" dirty="0" smtClean="0"/>
+              <a:rPr lang="en-US" dirty="0"/>
               <a:t>Recap:</a:t>
             </a:r>
           </a:p>
@@ -1020,11 +1012,11 @@
               <a:buChar char="-"/>
             </a:pPr>
             <a:r>
-              <a:rPr lang="en-US" dirty="0" err="1" smtClean="0"/>
+              <a:rPr lang="en-US" dirty="0" err="1"/>
               <a:t>docker</a:t>
             </a:r>
             <a:r>
-              <a:rPr lang="en-US" dirty="0" smtClean="0"/>
+              <a:rPr lang="en-US" dirty="0"/>
               <a:t> 101 highlights</a:t>
             </a:r>
           </a:p>
@@ -1034,64 +1026,40 @@
               <a:buChar char="-"/>
             </a:pPr>
             <a:r>
-              <a:rPr lang="en-US" dirty="0" err="1" smtClean="0"/>
+              <a:rPr lang="en-US" dirty="0"/>
               <a:t>microservices</a:t>
             </a:r>
             <a:r>
-              <a:rPr lang="en-US" baseline="0" dirty="0" smtClean="0"/>
-              <a:t> </a:t>
-            </a:r>
-            <a:r>
-              <a:rPr lang="en-US" baseline="0" smtClean="0"/>
-              <a:t>101 highlights</a:t>
-            </a:r>
-            <a:endParaRPr lang="en-US" dirty="0" smtClean="0"/>
-          </a:p>
-          <a:p>
-            <a:endParaRPr lang="en-US" dirty="0" smtClean="0"/>
-          </a:p>
-          <a:p>
-            <a:r>
-              <a:rPr lang="en-US" dirty="0" smtClean="0"/>
+              <a:rPr lang="en-US" baseline="0" dirty="0"/>
+              <a:t> 101 highlights</a:t>
+            </a:r>
+            <a:endParaRPr lang="en-US" dirty="0"/>
+          </a:p>
+          <a:p>
+            <a:endParaRPr lang="en-US" dirty="0"/>
+          </a:p>
+          <a:p>
+            <a:r>
+              <a:rPr lang="en-US" dirty="0"/>
               <a:t>Docker 102: </a:t>
             </a:r>
             <a:r>
-              <a:rPr lang="en-US" dirty="0" err="1" smtClean="0"/>
+              <a:rPr lang="en-US" dirty="0" err="1"/>
               <a:t>meerdere</a:t>
             </a:r>
             <a:r>
-              <a:rPr lang="en-US" dirty="0" smtClean="0"/>
+              <a:rPr lang="en-US" dirty="0"/>
               <a:t> containers die </a:t>
             </a:r>
             <a:r>
-              <a:rPr lang="en-US" dirty="0" err="1" smtClean="0"/>
+              <a:rPr lang="en-US" dirty="0" err="1"/>
               <a:t>samen</a:t>
             </a:r>
             <a:r>
-              <a:rPr lang="en-US" baseline="0" dirty="0" err="1" smtClean="0"/>
+              <a:rPr lang="en-US" baseline="0" dirty="0" err="1"/>
               <a:t>werken</a:t>
             </a:r>
-            <a:endParaRPr lang="en-US" baseline="0" dirty="0" smtClean="0"/>
-          </a:p>
-          <a:p>
-            <a:endParaRPr lang="en-US" baseline="0" dirty="0" smtClean="0"/>
-          </a:p>
-          <a:p>
-            <a:r>
-              <a:rPr lang="en-US" baseline="0" dirty="0" smtClean="0"/>
-              <a:t>N.B. </a:t>
-            </a:r>
-            <a:r>
-              <a:rPr lang="en-US" baseline="0" dirty="0" err="1" smtClean="0"/>
-              <a:t>evaluatieformulieren</a:t>
-            </a:r>
-            <a:r>
-              <a:rPr lang="en-US" baseline="0" dirty="0" smtClean="0"/>
-              <a:t> Hans Kamphorst!!!</a:t>
-            </a:r>
-          </a:p>
-          <a:p>
-            <a:endParaRPr lang="nl-NL" dirty="0"/>
+            <a:endParaRPr lang="en-US" baseline="0" dirty="0"/>
           </a:p>
         </p:txBody>
       </p:sp>
@@ -1122,6 +1090,154 @@
     <p:extLst>
       <p:ext uri="{BB962C8B-B14F-4D97-AF65-F5344CB8AC3E}">
         <p14:creationId xmlns:p14="http://schemas.microsoft.com/office/powerpoint/2010/main" val="4251357825"/>
+      </p:ext>
+    </p:extLst>
+  </p:cSld>
+  <p:clrMapOvr>
+    <a:masterClrMapping/>
+  </p:clrMapOvr>
+</p:notes>
+</file>
+
+<file path=ppt/notesSlides/notesSlide5.xml><?xml version="1.0" encoding="utf-8"?>
+<p:notes xmlns:a="http://schemas.openxmlformats.org/drawingml/2006/main" xmlns:r="http://schemas.openxmlformats.org/officeDocument/2006/relationships" xmlns:p="http://schemas.openxmlformats.org/presentationml/2006/main">
+  <p:cSld>
+    <p:spTree>
+      <p:nvGrpSpPr>
+        <p:cNvPr id="1" name=""/>
+        <p:cNvGrpSpPr/>
+        <p:nvPr/>
+      </p:nvGrpSpPr>
+      <p:grpSpPr>
+        <a:xfrm>
+          <a:off x="0" y="0"/>
+          <a:ext cx="0" cy="0"/>
+          <a:chOff x="0" y="0"/>
+          <a:chExt cx="0" cy="0"/>
+        </a:xfrm>
+      </p:grpSpPr>
+      <p:sp>
+        <p:nvSpPr>
+          <p:cNvPr id="2" name="Slide Image Placeholder 1"/>
+          <p:cNvSpPr>
+            <a:spLocks noGrp="1" noRot="1" noChangeAspect="1"/>
+          </p:cNvSpPr>
+          <p:nvPr>
+            <p:ph type="sldImg"/>
+          </p:nvPr>
+        </p:nvSpPr>
+        <p:spPr/>
+      </p:sp>
+      <p:sp>
+        <p:nvSpPr>
+          <p:cNvPr id="3" name="Notes Placeholder 2"/>
+          <p:cNvSpPr>
+            <a:spLocks noGrp="1"/>
+          </p:cNvSpPr>
+          <p:nvPr>
+            <p:ph type="body" idx="1"/>
+          </p:nvPr>
+        </p:nvSpPr>
+        <p:spPr/>
+        <p:txBody>
+          <a:bodyPr/>
+          <a:lstStyle/>
+          <a:p>
+            <a:r>
+              <a:rPr lang="en-US" dirty="0"/>
+              <a:t>Recap:</a:t>
+            </a:r>
+          </a:p>
+          <a:p>
+            <a:pPr marL="171450" indent="-171450">
+              <a:buFontTx/>
+              <a:buChar char="-"/>
+            </a:pPr>
+            <a:r>
+              <a:rPr lang="en-US" dirty="0"/>
+              <a:t>docker 102 highlights</a:t>
+            </a:r>
+          </a:p>
+          <a:p>
+            <a:pPr marL="171450" indent="-171450">
+              <a:buFontTx/>
+              <a:buChar char="-"/>
+            </a:pPr>
+            <a:r>
+              <a:rPr lang="en-US" dirty="0"/>
+              <a:t>microservices</a:t>
+            </a:r>
+            <a:r>
+              <a:rPr lang="en-US" baseline="0" dirty="0"/>
+              <a:t> 102 highlights</a:t>
+            </a:r>
+            <a:endParaRPr lang="en-US" dirty="0"/>
+          </a:p>
+          <a:p>
+            <a:endParaRPr lang="en-US" dirty="0"/>
+          </a:p>
+          <a:p>
+            <a:r>
+              <a:rPr lang="en-US" dirty="0"/>
+              <a:t>Docker 103: container orchestration</a:t>
+            </a:r>
+            <a:endParaRPr lang="en-US" baseline="0" dirty="0"/>
+          </a:p>
+          <a:p>
+            <a:r>
+              <a:rPr lang="en-US" baseline="0" dirty="0"/>
+              <a:t>Microservices: casus ATX</a:t>
+            </a:r>
+          </a:p>
+          <a:p>
+            <a:endParaRPr lang="en-US" baseline="0" dirty="0"/>
+          </a:p>
+          <a:p>
+            <a:r>
+              <a:rPr lang="en-US" baseline="0" dirty="0"/>
+              <a:t>N.B. </a:t>
+            </a:r>
+            <a:r>
+              <a:rPr lang="en-US" baseline="0" dirty="0" err="1"/>
+              <a:t>evaluatieformulieren</a:t>
+            </a:r>
+            <a:r>
+              <a:rPr lang="en-US" baseline="0" dirty="0"/>
+              <a:t> Hans Kamphorst!!!</a:t>
+            </a:r>
+          </a:p>
+          <a:p>
+            <a:endParaRPr lang="nl-NL" dirty="0"/>
+          </a:p>
+        </p:txBody>
+      </p:sp>
+      <p:sp>
+        <p:nvSpPr>
+          <p:cNvPr id="4" name="Slide Number Placeholder 3"/>
+          <p:cNvSpPr>
+            <a:spLocks noGrp="1"/>
+          </p:cNvSpPr>
+          <p:nvPr>
+            <p:ph type="sldNum" sz="quarter" idx="10"/>
+          </p:nvPr>
+        </p:nvSpPr>
+        <p:spPr/>
+        <p:txBody>
+          <a:bodyPr/>
+          <a:lstStyle/>
+          <a:p>
+            <a:fld id="{2DB1139D-5AC7-4B0B-A715-E40E0591EF82}" type="slidenum">
+              <a:rPr lang="nl-NL" smtClean="0"/>
+              <a:t>6</a:t>
+            </a:fld>
+            <a:endParaRPr lang="nl-NL" dirty="0"/>
+          </a:p>
+        </p:txBody>
+      </p:sp>
+    </p:spTree>
+    <p:extLst>
+      <p:ext uri="{BB962C8B-B14F-4D97-AF65-F5344CB8AC3E}">
+        <p14:creationId xmlns:p14="http://schemas.microsoft.com/office/powerpoint/2010/main" val="652044949"/>
       </p:ext>
     </p:extLst>
   </p:cSld>
@@ -1210,10 +1326,9 @@
           </a:lstStyle>
           <a:p>
             <a:r>
-              <a:rPr lang="nl-NL" dirty="0" smtClean="0"/>
+              <a:rPr lang="nl-NL" dirty="0"/>
               <a:t>KLIK OM DE STIJL TE BEWERKEN</a:t>
             </a:r>
-            <a:endParaRPr lang="nl-NL" dirty="0"/>
           </a:p>
         </p:txBody>
       </p:sp>
@@ -1246,7 +1361,7 @@
           </a:lstStyle>
           <a:p>
             <a:r>
-              <a:rPr lang="en-US" smtClean="0"/>
+              <a:rPr lang="en-US"/>
               <a:t>Johannes Sim &amp; Renzo veldkamp</a:t>
             </a:r>
             <a:endParaRPr lang="nl-NL" dirty="0"/>
@@ -1283,7 +1398,7 @@
           <a:p>
             <a:fld id="{69E2E37C-AA1E-43B2-B213-E688D587CE49}" type="datetime4">
               <a:rPr lang="nl-NL" smtClean="0"/>
-              <a:t>14 november 2017</a:t>
+              <a:t>5 oktober 2018</a:t>
             </a:fld>
             <a:endParaRPr lang="nl-NL" dirty="0"/>
           </a:p>
@@ -1299,13 +1414,6 @@
   <p:clrMapOvr>
     <a:masterClrMapping/>
   </p:clrMapOvr>
-  <p:timing>
-    <p:tnLst>
-      <p:par>
-        <p:cTn id="1" dur="indefinite" restart="never" nodeType="tmRoot"/>
-      </p:par>
-    </p:tnLst>
-  </p:timing>
 </p:sldLayout>
 </file>
 
@@ -1342,10 +1450,9 @@
           <a:lstStyle/>
           <a:p>
             <a:r>
-              <a:rPr lang="nl-NL" dirty="0" smtClean="0"/>
+              <a:rPr lang="nl-NL" dirty="0"/>
               <a:t>KLIK OM DE STIJL TE BEWERKEN</a:t>
             </a:r>
-            <a:endParaRPr lang="nl-NL" dirty="0"/>
           </a:p>
         </p:txBody>
       </p:sp>
@@ -1371,21 +1478,21 @@
           <a:p>
             <a:pPr lvl="0"/>
             <a:r>
-              <a:rPr lang="nl-NL" dirty="0" smtClean="0"/>
+              <a:rPr lang="nl-NL" dirty="0"/>
               <a:t>Klik om de modelstijlen te bewerken</a:t>
             </a:r>
           </a:p>
           <a:p>
             <a:pPr lvl="1"/>
             <a:r>
-              <a:rPr lang="nl-NL" dirty="0" smtClean="0"/>
+              <a:rPr lang="nl-NL" dirty="0"/>
               <a:t>Tweede niveau</a:t>
             </a:r>
           </a:p>
           <a:p>
             <a:pPr lvl="2"/>
             <a:r>
-              <a:rPr lang="nl-NL" dirty="0" smtClean="0"/>
+              <a:rPr lang="nl-NL" dirty="0"/>
               <a:t>Derde niveau</a:t>
             </a:r>
           </a:p>
@@ -1408,7 +1515,7 @@
           <a:p>
             <a:fld id="{96BF97C2-7262-427C-9F3E-B0D6D33F54E2}" type="datetime4">
               <a:rPr lang="nl-NL" smtClean="0"/>
-              <a:t>14 november 2017</a:t>
+              <a:t>5 oktober 2018</a:t>
             </a:fld>
             <a:endParaRPr lang="nl-NL" dirty="0"/>
           </a:p>
@@ -1443,7 +1550,7 @@
           </a:lstStyle>
           <a:p>
             <a:r>
-              <a:rPr lang="nl-NL" smtClean="0"/>
+              <a:rPr lang="nl-NL"/>
               <a:t>Johannes Sim &amp; Renzo veldkamp</a:t>
             </a:r>
             <a:endParaRPr lang="nl-NL" dirty="0"/>
@@ -1553,13 +1660,6 @@
   <p:clrMapOvr>
     <a:masterClrMapping/>
   </p:clrMapOvr>
-  <p:timing>
-    <p:tnLst>
-      <p:par>
-        <p:cTn id="1" dur="indefinite" restart="never" nodeType="tmRoot"/>
-      </p:par>
-    </p:tnLst>
-  </p:timing>
 </p:sldLayout>
 </file>
 
@@ -1602,21 +1702,21 @@
           <a:p>
             <a:pPr lvl="0"/>
             <a:r>
-              <a:rPr lang="nl-NL" dirty="0" smtClean="0"/>
+              <a:rPr lang="nl-NL" dirty="0"/>
               <a:t>Klik om de modelstijlen te bewerken</a:t>
             </a:r>
           </a:p>
           <a:p>
             <a:pPr lvl="1"/>
             <a:r>
-              <a:rPr lang="nl-NL" dirty="0" smtClean="0"/>
+              <a:rPr lang="nl-NL" dirty="0"/>
               <a:t>Tweede niveau</a:t>
             </a:r>
           </a:p>
           <a:p>
             <a:pPr lvl="2"/>
             <a:r>
-              <a:rPr lang="nl-NL" dirty="0" smtClean="0"/>
+              <a:rPr lang="nl-NL" dirty="0"/>
               <a:t>Derde niveau</a:t>
             </a:r>
           </a:p>
@@ -1639,7 +1739,7 @@
           <a:p>
             <a:fld id="{AB63B3A2-628B-479E-BF05-5959017C6A02}" type="datetime4">
               <a:rPr lang="nl-NL" smtClean="0"/>
-              <a:t>14 november 2017</a:t>
+              <a:t>5 oktober 2018</a:t>
             </a:fld>
             <a:endParaRPr lang="nl-NL" dirty="0"/>
           </a:p>
@@ -1674,7 +1774,7 @@
           </a:lstStyle>
           <a:p>
             <a:r>
-              <a:rPr lang="nl-NL" smtClean="0"/>
+              <a:rPr lang="nl-NL"/>
               <a:t>Johannes Sim &amp; Renzo veldkamp</a:t>
             </a:r>
             <a:endParaRPr lang="nl-NL" dirty="0"/>
@@ -1784,13 +1884,6 @@
   <p:clrMapOvr>
     <a:masterClrMapping/>
   </p:clrMapOvr>
-  <p:timing>
-    <p:tnLst>
-      <p:par>
-        <p:cTn id="1" dur="indefinite" restart="never" nodeType="tmRoot"/>
-      </p:par>
-    </p:tnLst>
-  </p:timing>
 </p:sldLayout>
 </file>
 
@@ -1827,10 +1920,9 @@
           <a:lstStyle/>
           <a:p>
             <a:r>
-              <a:rPr lang="nl-NL" dirty="0" smtClean="0"/>
+              <a:rPr lang="nl-NL" dirty="0"/>
               <a:t>KLIK OM DE STIJL TE BEWERKEN</a:t>
             </a:r>
-            <a:endParaRPr lang="nl-NL" dirty="0"/>
           </a:p>
         </p:txBody>
       </p:sp>
@@ -1851,38 +1943,37 @@
           <a:p>
             <a:pPr lvl="0"/>
             <a:r>
-              <a:rPr lang="nl-NL" dirty="0" smtClean="0"/>
+              <a:rPr lang="nl-NL" dirty="0"/>
               <a:t>Klik om de modelstijlen te bewerken</a:t>
             </a:r>
           </a:p>
           <a:p>
             <a:pPr lvl="1"/>
             <a:r>
-              <a:rPr lang="nl-NL" dirty="0" smtClean="0"/>
+              <a:rPr lang="nl-NL" dirty="0"/>
               <a:t>Tweede niveau</a:t>
             </a:r>
           </a:p>
           <a:p>
             <a:pPr lvl="2"/>
             <a:r>
-              <a:rPr lang="nl-NL" dirty="0" smtClean="0"/>
+              <a:rPr lang="nl-NL" dirty="0"/>
               <a:t>Derde niveau</a:t>
             </a:r>
           </a:p>
           <a:p>
             <a:pPr lvl="3"/>
             <a:r>
-              <a:rPr lang="nl-NL" dirty="0" smtClean="0"/>
+              <a:rPr lang="nl-NL" dirty="0"/>
               <a:t>Vierde niveau</a:t>
             </a:r>
           </a:p>
           <a:p>
             <a:pPr lvl="4"/>
             <a:r>
-              <a:rPr lang="nl-NL" dirty="0" smtClean="0"/>
+              <a:rPr lang="nl-NL" dirty="0"/>
               <a:t>Vijfde niveau</a:t>
             </a:r>
-            <a:endParaRPr lang="nl-NL" dirty="0"/>
           </a:p>
         </p:txBody>
       </p:sp>
@@ -1915,7 +2006,7 @@
             <a:fld id="{249B52C1-75DC-496B-AF3F-4978B95BB865}" type="datetime4">
               <a:rPr lang="nl-NL" smtClean="0"/>
               <a:pPr/>
-              <a:t>14 november 2017</a:t>
+              <a:t>5 oktober 2018</a:t>
             </a:fld>
             <a:endParaRPr lang="nl-NL" dirty="0"/>
           </a:p>
@@ -1953,11 +2044,11 @@
           </a:lstStyle>
           <a:p>
             <a:r>
-              <a:rPr lang="nl-NL" dirty="0" smtClean="0"/>
+              <a:rPr lang="nl-NL" dirty="0"/>
               <a:t>Johannes Sim &amp; Renzo </a:t>
             </a:r>
             <a:r>
-              <a:rPr lang="nl-NL" dirty="0" err="1" smtClean="0"/>
+              <a:rPr lang="nl-NL" dirty="0" err="1"/>
               <a:t>veldkamp</a:t>
             </a:r>
             <a:endParaRPr lang="nl-NL" dirty="0"/>
@@ -1974,13 +2065,6 @@
   <p:clrMapOvr>
     <a:masterClrMapping/>
   </p:clrMapOvr>
-  <p:timing>
-    <p:tnLst>
-      <p:par>
-        <p:cTn id="1" dur="indefinite" restart="never" nodeType="tmRoot"/>
-      </p:par>
-    </p:tnLst>
-  </p:timing>
 </p:sldLayout>
 </file>
 
@@ -2018,7 +2102,7 @@
           <a:p>
             <a:fld id="{8D31B592-DB5E-43FC-B016-67E26C01643F}" type="datetime4">
               <a:rPr lang="nl-NL" smtClean="0"/>
-              <a:t>14 november 2017</a:t>
+              <a:t>5 oktober 2018</a:t>
             </a:fld>
             <a:endParaRPr lang="nl-NL" dirty="0"/>
           </a:p>
@@ -2048,7 +2132,7 @@
           </a:lstStyle>
           <a:p>
             <a:r>
-              <a:rPr lang="nl-NL" smtClean="0"/>
+              <a:rPr lang="nl-NL"/>
               <a:t>Johannes Sim &amp; Renzo veldkamp</a:t>
             </a:r>
             <a:endParaRPr lang="nl-NL" dirty="0"/>
@@ -2096,13 +2180,6 @@
   <p:clrMapOvr>
     <a:masterClrMapping/>
   </p:clrMapOvr>
-  <p:timing>
-    <p:tnLst>
-      <p:par>
-        <p:cTn id="1" dur="indefinite" restart="never" nodeType="tmRoot"/>
-      </p:par>
-    </p:tnLst>
-  </p:timing>
 </p:sldLayout>
 </file>
 
@@ -2151,10 +2228,9 @@
           </a:lstStyle>
           <a:p>
             <a:r>
-              <a:rPr lang="nl-NL" dirty="0" smtClean="0"/>
+              <a:rPr lang="nl-NL" dirty="0"/>
               <a:t>KLIK OM DE STIJL TE BEWERKEN</a:t>
             </a:r>
-            <a:endParaRPr lang="nl-NL" dirty="0"/>
           </a:p>
         </p:txBody>
       </p:sp>
@@ -2185,38 +2261,37 @@
           <a:p>
             <a:pPr lvl="0"/>
             <a:r>
-              <a:rPr lang="nl-NL" dirty="0" smtClean="0"/>
+              <a:rPr lang="nl-NL" dirty="0"/>
               <a:t>Klik om de modelstijlen te bewerken</a:t>
             </a:r>
           </a:p>
           <a:p>
             <a:pPr lvl="1"/>
             <a:r>
-              <a:rPr lang="nl-NL" dirty="0" smtClean="0"/>
+              <a:rPr lang="nl-NL" dirty="0"/>
               <a:t>Tweede niveau</a:t>
             </a:r>
           </a:p>
           <a:p>
             <a:pPr lvl="2"/>
             <a:r>
-              <a:rPr lang="nl-NL" dirty="0" smtClean="0"/>
+              <a:rPr lang="nl-NL" dirty="0"/>
               <a:t>Derde niveau</a:t>
             </a:r>
           </a:p>
           <a:p>
             <a:pPr lvl="3"/>
             <a:r>
-              <a:rPr lang="nl-NL" dirty="0" smtClean="0"/>
+              <a:rPr lang="nl-NL" dirty="0"/>
               <a:t>Vierde niveau</a:t>
             </a:r>
           </a:p>
           <a:p>
             <a:pPr lvl="4"/>
             <a:r>
-              <a:rPr lang="nl-NL" dirty="0" smtClean="0"/>
+              <a:rPr lang="nl-NL" dirty="0"/>
               <a:t>Vijfde niveau</a:t>
             </a:r>
-            <a:endParaRPr lang="nl-NL" dirty="0"/>
           </a:p>
         </p:txBody>
       </p:sp>
@@ -2237,7 +2312,7 @@
           <a:p>
             <a:fld id="{92E94904-3BB7-4874-AB8B-F31F00F8A078}" type="datetime4">
               <a:rPr lang="nl-NL" smtClean="0"/>
-              <a:t>14 november 2017</a:t>
+              <a:t>5 oktober 2018</a:t>
             </a:fld>
             <a:endParaRPr lang="nl-NL" dirty="0"/>
           </a:p>
@@ -2272,7 +2347,7 @@
           </a:lstStyle>
           <a:p>
             <a:r>
-              <a:rPr lang="nl-NL" smtClean="0"/>
+              <a:rPr lang="nl-NL"/>
               <a:t>Johannes Sim &amp; Renzo veldkamp</a:t>
             </a:r>
             <a:endParaRPr lang="nl-NL" dirty="0"/>
@@ -2320,13 +2395,6 @@
   <p:clrMapOvr>
     <a:masterClrMapping/>
   </p:clrMapOvr>
-  <p:timing>
-    <p:tnLst>
-      <p:par>
-        <p:cTn id="1" dur="indefinite" restart="never" nodeType="tmRoot"/>
-      </p:par>
-    </p:tnLst>
-  </p:timing>
 </p:sldLayout>
 </file>
 
@@ -2374,38 +2442,37 @@
           <a:p>
             <a:pPr lvl="0"/>
             <a:r>
-              <a:rPr lang="nl-NL" dirty="0" smtClean="0"/>
+              <a:rPr lang="nl-NL" dirty="0"/>
               <a:t>Klik om de modelstijlen te bewerken</a:t>
             </a:r>
           </a:p>
           <a:p>
             <a:pPr lvl="1"/>
             <a:r>
-              <a:rPr lang="nl-NL" dirty="0" smtClean="0"/>
+              <a:rPr lang="nl-NL" dirty="0"/>
               <a:t>Tweede niveau</a:t>
             </a:r>
           </a:p>
           <a:p>
             <a:pPr lvl="2"/>
             <a:r>
-              <a:rPr lang="nl-NL" dirty="0" smtClean="0"/>
+              <a:rPr lang="nl-NL" dirty="0"/>
               <a:t>Derde niveau</a:t>
             </a:r>
           </a:p>
           <a:p>
             <a:pPr lvl="3"/>
             <a:r>
-              <a:rPr lang="nl-NL" dirty="0" smtClean="0"/>
+              <a:rPr lang="nl-NL" dirty="0"/>
               <a:t>Vierde niveau</a:t>
             </a:r>
           </a:p>
           <a:p>
             <a:pPr lvl="4"/>
             <a:r>
-              <a:rPr lang="nl-NL" dirty="0" smtClean="0"/>
+              <a:rPr lang="nl-NL" dirty="0"/>
               <a:t>Vijfde niveau</a:t>
             </a:r>
-            <a:endParaRPr lang="nl-NL" dirty="0"/>
           </a:p>
         </p:txBody>
       </p:sp>
@@ -2426,7 +2493,7 @@
           <a:p>
             <a:fld id="{A9642D5E-8E53-4D94-8479-CCF9387ED904}" type="datetime4">
               <a:rPr lang="nl-NL" smtClean="0"/>
-              <a:t>14 november 2017</a:t>
+              <a:t>5 oktober 2018</a:t>
             </a:fld>
             <a:endParaRPr lang="nl-NL" dirty="0"/>
           </a:p>
@@ -2461,7 +2528,7 @@
           </a:lstStyle>
           <a:p>
             <a:r>
-              <a:rPr lang="nl-NL" smtClean="0"/>
+              <a:rPr lang="nl-NL"/>
               <a:t>Johannes Sim &amp; Renzo veldkamp</a:t>
             </a:r>
             <a:endParaRPr lang="nl-NL" dirty="0"/>
@@ -2509,13 +2576,6 @@
   <p:clrMapOvr>
     <a:masterClrMapping/>
   </p:clrMapOvr>
-  <p:timing>
-    <p:tnLst>
-      <p:par>
-        <p:cTn id="1" dur="indefinite" restart="never" nodeType="tmRoot"/>
-      </p:par>
-    </p:tnLst>
-  </p:timing>
 </p:sldLayout>
 </file>
 
@@ -2564,10 +2624,9 @@
           </a:lstStyle>
           <a:p>
             <a:r>
-              <a:rPr lang="nl-NL" dirty="0" smtClean="0"/>
+              <a:rPr lang="nl-NL" dirty="0"/>
               <a:t>KLIK OM DE STIJL TE BEWERKEN</a:t>
             </a:r>
-            <a:endParaRPr lang="nl-NL" dirty="0"/>
           </a:p>
         </p:txBody>
       </p:sp>
@@ -2598,38 +2657,37 @@
           <a:p>
             <a:pPr lvl="0"/>
             <a:r>
-              <a:rPr lang="nl-NL" dirty="0" smtClean="0"/>
+              <a:rPr lang="nl-NL" dirty="0"/>
               <a:t>Klik om de modelstijlen te bewerken</a:t>
             </a:r>
           </a:p>
           <a:p>
             <a:pPr lvl="1"/>
             <a:r>
-              <a:rPr lang="nl-NL" dirty="0" smtClean="0"/>
+              <a:rPr lang="nl-NL" dirty="0"/>
               <a:t>Tweede niveau</a:t>
             </a:r>
           </a:p>
           <a:p>
             <a:pPr lvl="2"/>
             <a:r>
-              <a:rPr lang="nl-NL" dirty="0" smtClean="0"/>
+              <a:rPr lang="nl-NL" dirty="0"/>
               <a:t>Derde niveau</a:t>
             </a:r>
           </a:p>
           <a:p>
             <a:pPr lvl="3"/>
             <a:r>
-              <a:rPr lang="nl-NL" dirty="0" smtClean="0"/>
+              <a:rPr lang="nl-NL" dirty="0"/>
               <a:t>Vierde niveau</a:t>
             </a:r>
           </a:p>
           <a:p>
             <a:pPr lvl="4"/>
             <a:r>
-              <a:rPr lang="nl-NL" dirty="0" smtClean="0"/>
+              <a:rPr lang="nl-NL" dirty="0"/>
               <a:t>Vijfde niveau</a:t>
             </a:r>
-            <a:endParaRPr lang="nl-NL" dirty="0"/>
           </a:p>
         </p:txBody>
       </p:sp>
@@ -2650,7 +2708,7 @@
           <a:p>
             <a:fld id="{87D76D0B-AA25-481F-9FCE-BD155C5A6085}" type="datetime4">
               <a:rPr lang="nl-NL" smtClean="0"/>
-              <a:t>14 november 2017</a:t>
+              <a:t>5 oktober 2018</a:t>
             </a:fld>
             <a:endParaRPr lang="nl-NL" dirty="0"/>
           </a:p>
@@ -2685,7 +2743,7 @@
           </a:lstStyle>
           <a:p>
             <a:r>
-              <a:rPr lang="nl-NL" smtClean="0"/>
+              <a:rPr lang="nl-NL"/>
               <a:t>Johannes Sim &amp; Renzo veldkamp</a:t>
             </a:r>
             <a:endParaRPr lang="nl-NL" dirty="0"/>
@@ -2764,13 +2822,6 @@
   <p:clrMapOvr>
     <a:masterClrMapping/>
   </p:clrMapOvr>
-  <p:timing>
-    <p:tnLst>
-      <p:par>
-        <p:cTn id="1" dur="indefinite" restart="never" nodeType="tmRoot"/>
-      </p:par>
-    </p:tnLst>
-  </p:timing>
 </p:sldLayout>
 </file>
 
@@ -2818,38 +2869,37 @@
           <a:p>
             <a:pPr lvl="0"/>
             <a:r>
-              <a:rPr lang="nl-NL" dirty="0" smtClean="0"/>
+              <a:rPr lang="nl-NL" dirty="0"/>
               <a:t>Klik om de modelstijlen te bewerken</a:t>
             </a:r>
           </a:p>
           <a:p>
             <a:pPr lvl="1"/>
             <a:r>
-              <a:rPr lang="nl-NL" dirty="0" smtClean="0"/>
+              <a:rPr lang="nl-NL" dirty="0"/>
               <a:t>Tweede niveau</a:t>
             </a:r>
           </a:p>
           <a:p>
             <a:pPr lvl="2"/>
             <a:r>
-              <a:rPr lang="nl-NL" dirty="0" smtClean="0"/>
+              <a:rPr lang="nl-NL" dirty="0"/>
               <a:t>Derde niveau</a:t>
             </a:r>
           </a:p>
           <a:p>
             <a:pPr lvl="3"/>
             <a:r>
-              <a:rPr lang="nl-NL" dirty="0" smtClean="0"/>
+              <a:rPr lang="nl-NL" dirty="0"/>
               <a:t>Vierde niveau</a:t>
             </a:r>
           </a:p>
           <a:p>
             <a:pPr lvl="4"/>
             <a:r>
-              <a:rPr lang="nl-NL" dirty="0" smtClean="0"/>
+              <a:rPr lang="nl-NL" dirty="0"/>
               <a:t>Vijfde niveau</a:t>
             </a:r>
-            <a:endParaRPr lang="nl-NL" dirty="0"/>
           </a:p>
         </p:txBody>
       </p:sp>
@@ -2870,7 +2920,7 @@
           <a:p>
             <a:fld id="{88C11819-B839-4C27-8B45-7170CEF46D62}" type="datetime4">
               <a:rPr lang="nl-NL" smtClean="0"/>
-              <a:t>14 november 2017</a:t>
+              <a:t>5 oktober 2018</a:t>
             </a:fld>
             <a:endParaRPr lang="nl-NL" dirty="0"/>
           </a:p>
@@ -2905,7 +2955,7 @@
           </a:lstStyle>
           <a:p>
             <a:r>
-              <a:rPr lang="nl-NL" smtClean="0"/>
+              <a:rPr lang="nl-NL"/>
               <a:t>Johannes Sim &amp; Renzo veldkamp</a:t>
             </a:r>
             <a:endParaRPr lang="nl-NL" dirty="0"/>
@@ -2984,13 +3034,6 @@
   <p:clrMapOvr>
     <a:masterClrMapping/>
   </p:clrMapOvr>
-  <p:timing>
-    <p:tnLst>
-      <p:par>
-        <p:cTn id="1" dur="indefinite" restart="never" nodeType="tmRoot"/>
-      </p:par>
-    </p:tnLst>
-  </p:timing>
 </p:sldLayout>
 </file>
 
@@ -3027,10 +3070,9 @@
           <a:lstStyle/>
           <a:p>
             <a:r>
-              <a:rPr lang="nl-NL" dirty="0" smtClean="0"/>
+              <a:rPr lang="nl-NL" dirty="0"/>
               <a:t>KLIK OM DE STIJL TE BEWERKEN</a:t>
             </a:r>
-            <a:endParaRPr lang="nl-NL" dirty="0"/>
           </a:p>
         </p:txBody>
       </p:sp>
@@ -3056,21 +3098,21 @@
           <a:p>
             <a:pPr lvl="0"/>
             <a:r>
-              <a:rPr lang="nl-NL" dirty="0" smtClean="0"/>
+              <a:rPr lang="nl-NL" dirty="0"/>
               <a:t>Klik om de modelstijlen te bewerken</a:t>
             </a:r>
           </a:p>
           <a:p>
             <a:pPr lvl="1"/>
             <a:r>
-              <a:rPr lang="nl-NL" dirty="0" smtClean="0"/>
+              <a:rPr lang="nl-NL" dirty="0"/>
               <a:t>Tweede niveau</a:t>
             </a:r>
           </a:p>
           <a:p>
             <a:pPr lvl="2"/>
             <a:r>
-              <a:rPr lang="nl-NL" dirty="0" smtClean="0"/>
+              <a:rPr lang="nl-NL" dirty="0"/>
               <a:t>Derde niveau</a:t>
             </a:r>
           </a:p>
@@ -3093,7 +3135,7 @@
           <a:p>
             <a:fld id="{174613E7-29CA-4C1D-88BD-FA51696C19FE}" type="datetime4">
               <a:rPr lang="nl-NL" smtClean="0"/>
-              <a:t>14 november 2017</a:t>
+              <a:t>5 oktober 2018</a:t>
             </a:fld>
             <a:endParaRPr lang="nl-NL" dirty="0"/>
           </a:p>
@@ -3128,7 +3170,7 @@
           </a:lstStyle>
           <a:p>
             <a:r>
-              <a:rPr lang="nl-NL" smtClean="0"/>
+              <a:rPr lang="nl-NL"/>
               <a:t>Johannes Sim &amp; Renzo veldkamp</a:t>
             </a:r>
             <a:endParaRPr lang="nl-NL" dirty="0"/>
@@ -3207,13 +3249,6 @@
   <p:clrMapOvr>
     <a:masterClrMapping/>
   </p:clrMapOvr>
-  <p:timing>
-    <p:tnLst>
-      <p:par>
-        <p:cTn id="1" dur="indefinite" restart="never" nodeType="tmRoot"/>
-      </p:par>
-    </p:tnLst>
-  </p:timing>
 </p:sldLayout>
 </file>
 
@@ -3256,21 +3291,21 @@
           <a:p>
             <a:pPr lvl="0"/>
             <a:r>
-              <a:rPr lang="nl-NL" dirty="0" smtClean="0"/>
+              <a:rPr lang="nl-NL" dirty="0"/>
               <a:t>Klik om de modelstijlen te bewerken</a:t>
             </a:r>
           </a:p>
           <a:p>
             <a:pPr lvl="1"/>
             <a:r>
-              <a:rPr lang="nl-NL" dirty="0" smtClean="0"/>
+              <a:rPr lang="nl-NL" dirty="0"/>
               <a:t>Tweede niveau</a:t>
             </a:r>
           </a:p>
           <a:p>
             <a:pPr lvl="2"/>
             <a:r>
-              <a:rPr lang="nl-NL" dirty="0" smtClean="0"/>
+              <a:rPr lang="nl-NL" dirty="0"/>
               <a:t>Derde niveau</a:t>
             </a:r>
           </a:p>
@@ -3293,7 +3328,7 @@
           <a:p>
             <a:fld id="{9F389A9C-5452-4AF4-8D69-2209042ED2AB}" type="datetime4">
               <a:rPr lang="nl-NL" smtClean="0"/>
-              <a:t>14 november 2017</a:t>
+              <a:t>5 oktober 2018</a:t>
             </a:fld>
             <a:endParaRPr lang="nl-NL" dirty="0"/>
           </a:p>
@@ -3328,7 +3363,7 @@
           </a:lstStyle>
           <a:p>
             <a:r>
-              <a:rPr lang="nl-NL" smtClean="0"/>
+              <a:rPr lang="nl-NL"/>
               <a:t>Johannes Sim &amp; Renzo veldkamp</a:t>
             </a:r>
             <a:endParaRPr lang="nl-NL" dirty="0"/>
@@ -3407,13 +3442,6 @@
   <p:clrMapOvr>
     <a:masterClrMapping/>
   </p:clrMapOvr>
-  <p:timing>
-    <p:tnLst>
-      <p:par>
-        <p:cTn id="1" dur="indefinite" restart="never" nodeType="tmRoot"/>
-      </p:par>
-    </p:tnLst>
-  </p:timing>
 </p:sldLayout>
 </file>
 
@@ -3504,10 +3532,10 @@
           <a:p>
             <a:fld id="{59ABBC3E-A20C-4DEE-9D7A-437B797B148A}" type="datetime4">
               <a:rPr lang="nl-NL" smtClean="0"/>
-              <a:t>14 november 2017</a:t>
+              <a:t>5 oktober 2018</a:t>
             </a:fld>
             <a:r>
-              <a:rPr lang="en-US" smtClean="0"/>
+              <a:rPr lang="en-US"/>
               <a:t> </a:t>
             </a:r>
             <a:endParaRPr lang="nl-NL" dirty="0"/>
@@ -3540,10 +3568,9 @@
           <a:lstStyle/>
           <a:p>
             <a:r>
-              <a:rPr lang="nl-NL" dirty="0" smtClean="0"/>
+              <a:rPr lang="nl-NL" dirty="0"/>
               <a:t>KLIK OM DE STIJL TE BEWERKEN</a:t>
             </a:r>
-            <a:endParaRPr lang="nl-NL" dirty="0"/>
           </a:p>
         </p:txBody>
       </p:sp>
@@ -3574,38 +3601,37 @@
           <a:p>
             <a:pPr lvl="0"/>
             <a:r>
-              <a:rPr lang="nl-NL" dirty="0" smtClean="0"/>
+              <a:rPr lang="nl-NL" dirty="0"/>
               <a:t>Klik om de modelstijlen te bewerken</a:t>
             </a:r>
           </a:p>
           <a:p>
             <a:pPr lvl="1"/>
             <a:r>
-              <a:rPr lang="nl-NL" dirty="0" smtClean="0"/>
+              <a:rPr lang="nl-NL" dirty="0"/>
               <a:t>Tweede niveau</a:t>
             </a:r>
           </a:p>
           <a:p>
             <a:pPr lvl="2"/>
             <a:r>
-              <a:rPr lang="nl-NL" dirty="0" smtClean="0"/>
+              <a:rPr lang="nl-NL" dirty="0"/>
               <a:t>Derde niveau</a:t>
             </a:r>
           </a:p>
           <a:p>
             <a:pPr lvl="3"/>
             <a:r>
-              <a:rPr lang="nl-NL" dirty="0" smtClean="0"/>
+              <a:rPr lang="nl-NL" dirty="0"/>
               <a:t>Vierde niveau</a:t>
             </a:r>
           </a:p>
           <a:p>
             <a:pPr lvl="4"/>
             <a:r>
-              <a:rPr lang="nl-NL" dirty="0" smtClean="0"/>
+              <a:rPr lang="nl-NL" dirty="0"/>
               <a:t>Vijfde niveau</a:t>
             </a:r>
-            <a:endParaRPr lang="nl-NL" dirty="0"/>
           </a:p>
         </p:txBody>
       </p:sp>
@@ -3643,7 +3669,7 @@
           </a:lstStyle>
           <a:p>
             <a:r>
-              <a:rPr lang="nl-NL" smtClean="0"/>
+              <a:rPr lang="nl-NL"/>
               <a:t>Johannes Sim &amp; Renzo veldkamp</a:t>
             </a:r>
             <a:endParaRPr lang="nl-NL" dirty="0"/>
@@ -3671,13 +3697,6 @@
     <p:sldLayoutId id="2147483669" r:id="rId10"/>
     <p:sldLayoutId id="2147483670" r:id="rId11"/>
   </p:sldLayoutIdLst>
-  <p:timing>
-    <p:tnLst>
-      <p:par>
-        <p:cTn id="1" dur="indefinite" restart="never" nodeType="tmRoot"/>
-      </p:par>
-    </p:tnLst>
-  </p:timing>
   <p:hf sldNum="0" hdr="0"/>
   <p:txStyles>
     <p:titleStyle>
@@ -3982,18 +4001,14 @@
           <a:lstStyle/>
           <a:p>
             <a:r>
-              <a:rPr lang="en-US" dirty="0" err="1" smtClean="0"/>
+              <a:rPr lang="en-US" dirty="0" err="1"/>
               <a:t>Microservices</a:t>
             </a:r>
-            <a:r>
-              <a:rPr lang="en-US" dirty="0" smtClean="0"/>
-              <a:t/>
-            </a:r>
             <a:br>
-              <a:rPr lang="en-US" dirty="0" smtClean="0"/>
+              <a:rPr lang="en-US" dirty="0"/>
             </a:br>
             <a:r>
-              <a:rPr lang="en-US" dirty="0" smtClean="0"/>
+              <a:rPr lang="en-US" dirty="0"/>
               <a:t>hosted by Docker</a:t>
             </a:r>
             <a:endParaRPr lang="nl-NL" dirty="0"/>
@@ -4049,7 +4064,7 @@
           <a:p>
             <a:fld id="{E8809DAD-F941-4A15-ABB1-44FA32742BE9}" type="datetime4">
               <a:rPr lang="nl-NL" smtClean="0"/>
-              <a:t>14 november 2017</a:t>
+              <a:t>5 oktober 2018</a:t>
             </a:fld>
             <a:endParaRPr lang="nl-NL" dirty="0"/>
           </a:p>
@@ -4076,17 +4091,17 @@
           <a:lstStyle/>
           <a:p>
             <a:r>
-              <a:rPr lang="en-US" dirty="0" smtClean="0"/>
+              <a:rPr lang="en-US" dirty="0"/>
               <a:t>Johannes Sim &amp;</a:t>
             </a:r>
           </a:p>
           <a:p>
             <a:r>
-              <a:rPr lang="en-US" dirty="0" smtClean="0"/>
+              <a:rPr lang="en-US" dirty="0"/>
               <a:t>Renzo </a:t>
             </a:r>
             <a:r>
-              <a:rPr lang="en-US" dirty="0" err="1" smtClean="0"/>
+              <a:rPr lang="en-US" dirty="0" err="1"/>
               <a:t>veldkamp</a:t>
             </a:r>
             <a:endParaRPr lang="nl-NL" dirty="0"/>
@@ -4103,13 +4118,6 @@
   <p:clrMapOvr>
     <a:masterClrMapping/>
   </p:clrMapOvr>
-  <p:timing>
-    <p:tnLst>
-      <p:par>
-        <p:cTn id="1" dur="indefinite" restart="never" nodeType="tmRoot"/>
-      </p:par>
-    </p:tnLst>
-  </p:timing>
 </p:sld>
 </file>
 
@@ -4146,10 +4154,9 @@
           <a:lstStyle/>
           <a:p>
             <a:r>
-              <a:rPr lang="nl-NL" dirty="0" smtClean="0"/>
+              <a:rPr lang="nl-NL" dirty="0"/>
               <a:t>Doelstellingen</a:t>
             </a:r>
-            <a:endParaRPr lang="nl-NL" dirty="0"/>
           </a:p>
         </p:txBody>
       </p:sp>
@@ -4169,48 +4176,36 @@
           <a:lstStyle/>
           <a:p>
             <a:r>
-              <a:rPr lang="en-US" dirty="0" err="1" smtClean="0"/>
+              <a:rPr lang="en-US" dirty="0" err="1"/>
               <a:t>Kennis</a:t>
             </a:r>
             <a:r>
-              <a:rPr lang="en-US" dirty="0" smtClean="0"/>
-              <a:t> </a:t>
-            </a:r>
-            <a:r>
               <a:rPr lang="en-US" dirty="0"/>
-              <a:t>over </a:t>
-            </a:r>
-            <a:r>
-              <a:rPr lang="en-US" dirty="0" err="1" smtClean="0"/>
+              <a:t> over </a:t>
+            </a:r>
+            <a:r>
+              <a:rPr lang="en-US" dirty="0" err="1"/>
               <a:t>microservices</a:t>
             </a:r>
             <a:endParaRPr lang="en-US" dirty="0"/>
           </a:p>
           <a:p>
             <a:r>
-              <a:rPr lang="en-US" dirty="0" err="1" smtClean="0"/>
+              <a:rPr lang="en-US" dirty="0" err="1"/>
               <a:t>Kennis</a:t>
             </a:r>
             <a:r>
-              <a:rPr lang="en-US" dirty="0" smtClean="0"/>
-              <a:t> </a:t>
-            </a:r>
-            <a:r>
               <a:rPr lang="en-US" dirty="0"/>
-              <a:t>over Docker / </a:t>
-            </a:r>
-            <a:r>
-              <a:rPr lang="en-US" dirty="0" smtClean="0"/>
-              <a:t>containers</a:t>
-            </a:r>
-          </a:p>
-          <a:p>
-            <a:r>
-              <a:rPr lang="en-US" dirty="0" err="1" smtClean="0"/>
+              <a:t> over Docker / containers</a:t>
+            </a:r>
+          </a:p>
+          <a:p>
+            <a:r>
+              <a:rPr lang="en-US" dirty="0" err="1"/>
               <a:t>Praktische</a:t>
             </a:r>
             <a:r>
-              <a:rPr lang="en-US" dirty="0" smtClean="0"/>
+              <a:rPr lang="en-US" dirty="0"/>
               <a:t> </a:t>
             </a:r>
             <a:r>
@@ -4251,7 +4246,7 @@
                   <a:srgbClr val="009036"/>
                 </a:solidFill>
               </a:rPr>
-              <a:t>14 november 2017</a:t>
+              <a:t>5 oktober 2018</a:t>
             </a:fld>
             <a:endParaRPr lang="nl-NL" sz="900" cap="all" dirty="0">
               <a:solidFill>
@@ -4300,6 +4295,42 @@
           </a:p>
         </p:txBody>
       </p:sp>
+      <p:pic>
+        <p:nvPicPr>
+          <p:cNvPr id="7" name="Picture 6">
+            <a:extLst>
+              <a:ext uri="{FF2B5EF4-FFF2-40B4-BE49-F238E27FC236}">
+                <a16:creationId xmlns:a16="http://schemas.microsoft.com/office/drawing/2014/main" id="{A8A08DCA-9C51-4E9E-A1C5-B5319191D699}"/>
+              </a:ext>
+            </a:extLst>
+          </p:cNvPr>
+          <p:cNvPicPr>
+            <a:picLocks noChangeAspect="1"/>
+          </p:cNvPicPr>
+          <p:nvPr/>
+        </p:nvPicPr>
+        <p:blipFill>
+          <a:blip r:embed="rId2">
+            <a:extLst>
+              <a:ext uri="{28A0092B-C50C-407E-A947-70E740481C1C}">
+                <a14:useLocalDpi xmlns:a14="http://schemas.microsoft.com/office/drawing/2010/main" val="0"/>
+              </a:ext>
+            </a:extLst>
+          </a:blip>
+          <a:stretch>
+            <a:fillRect/>
+          </a:stretch>
+        </p:blipFill>
+        <p:spPr>
+          <a:xfrm>
+            <a:off x="5188135" y="2148207"/>
+            <a:ext cx="3592567" cy="3592567"/>
+          </a:xfrm>
+          <a:prstGeom prst="rect">
+            <a:avLst/>
+          </a:prstGeom>
+        </p:spPr>
+      </p:pic>
     </p:spTree>
     <p:extLst>
       <p:ext uri="{BB962C8B-B14F-4D97-AF65-F5344CB8AC3E}">
@@ -4310,13 +4341,6 @@
   <p:clrMapOvr>
     <a:masterClrMapping/>
   </p:clrMapOvr>
-  <p:timing>
-    <p:tnLst>
-      <p:par>
-        <p:cTn id="1" dur="indefinite" restart="never" nodeType="tmRoot"/>
-      </p:par>
-    </p:tnLst>
-  </p:timing>
 </p:sld>
 </file>
 
@@ -4353,7 +4377,7 @@
           <a:lstStyle/>
           <a:p>
             <a:r>
-              <a:rPr lang="nl-NL" cap="all" dirty="0" smtClean="0"/>
+              <a:rPr lang="nl-NL" cap="all" dirty="0"/>
               <a:t>onderwerpen</a:t>
             </a:r>
             <a:endParaRPr lang="nl-NL" dirty="0"/>
@@ -4388,7 +4412,7 @@
               </a:spcAft>
             </a:pPr>
             <a:r>
-              <a:rPr lang="nl-NL" dirty="0" smtClean="0"/>
+              <a:rPr lang="nl-NL" dirty="0"/>
               <a:t>Microservices architectuur</a:t>
             </a:r>
           </a:p>
@@ -4399,7 +4423,7 @@
               </a:spcAft>
             </a:pPr>
             <a:r>
-              <a:rPr lang="nl-NL" dirty="0" smtClean="0"/>
+              <a:rPr lang="nl-NL" dirty="0"/>
               <a:t>Mogelijkheden en gevolgen</a:t>
             </a:r>
           </a:p>
@@ -4410,10 +4434,9 @@
               </a:spcAft>
             </a:pPr>
             <a:r>
-              <a:rPr lang="en-US" dirty="0" smtClean="0"/>
+              <a:rPr lang="en-US" dirty="0"/>
               <a:t>Docker</a:t>
             </a:r>
-            <a:endParaRPr lang="en-US" dirty="0"/>
           </a:p>
           <a:p>
             <a:pPr>
@@ -4479,10 +4502,9 @@
               </a:spcAft>
             </a:pPr>
             <a:r>
-              <a:rPr lang="nl-NL" dirty="0" smtClean="0"/>
+              <a:rPr lang="nl-NL" dirty="0"/>
               <a:t>Referenties</a:t>
             </a:r>
-            <a:endParaRPr lang="nl-NL" dirty="0"/>
           </a:p>
         </p:txBody>
       </p:sp>
@@ -4502,7 +4524,7 @@
           <a:lstStyle/>
           <a:p>
             <a:r>
-              <a:rPr lang="nl-NL" dirty="0" smtClean="0">
+              <a:rPr lang="nl-NL" dirty="0">
                 <a:solidFill>
                   <a:srgbClr val="009036"/>
                 </a:solidFill>
@@ -4510,7 +4532,7 @@
               <a:t>Johannes Sim &amp; Renzo </a:t>
             </a:r>
             <a:r>
-              <a:rPr lang="nl-NL" dirty="0" err="1" smtClean="0">
+              <a:rPr lang="nl-NL" dirty="0" err="1">
                 <a:solidFill>
                   <a:srgbClr val="009036"/>
                 </a:solidFill>
@@ -4546,7 +4568,7 @@
                   <a:srgbClr val="009036"/>
                 </a:solidFill>
               </a:rPr>
-              <a:t>14 november 2017</a:t>
+              <a:t>5 oktober 2018</a:t>
             </a:fld>
             <a:endParaRPr lang="nl-NL" sz="900" cap="all" dirty="0">
               <a:solidFill>
@@ -4596,13 +4618,6 @@
   <p:clrMapOvr>
     <a:masterClrMapping/>
   </p:clrMapOvr>
-  <p:timing>
-    <p:tnLst>
-      <p:par>
-        <p:cTn id="1" dur="indefinite" restart="never" nodeType="tmRoot"/>
-      </p:par>
-    </p:tnLst>
-  </p:timing>
 </p:sld>
 </file>
 
@@ -4639,75 +4654,90 @@
           <a:lstStyle/>
           <a:p>
             <a:r>
-              <a:rPr lang="nl-NL" dirty="0" smtClean="0"/>
+              <a:rPr lang="nl-NL" dirty="0"/>
               <a:t>Programma Dag 1</a:t>
             </a:r>
+          </a:p>
+        </p:txBody>
+      </p:sp>
+      <p:sp>
+        <p:nvSpPr>
+          <p:cNvPr id="3" name="Content Placeholder 2"/>
+          <p:cNvSpPr>
+            <a:spLocks noGrp="1"/>
+          </p:cNvSpPr>
+          <p:nvPr>
+            <p:ph idx="1"/>
+          </p:nvPr>
+        </p:nvSpPr>
+        <p:spPr/>
+        <p:txBody>
+          <a:bodyPr/>
+          <a:lstStyle/>
+          <a:p>
+            <a:r>
+              <a:rPr lang="nl-NL" dirty="0"/>
+              <a:t>16:00 Verwachtingen</a:t>
+            </a:r>
+          </a:p>
+          <a:p>
+            <a:r>
+              <a:rPr lang="nl-NL" dirty="0"/>
+              <a:t>16:15 Introductie</a:t>
+            </a:r>
+          </a:p>
+          <a:p>
+            <a:r>
+              <a:rPr lang="nl-NL" dirty="0"/>
+              <a:t>16:30 Microservices 101 (</a:t>
+            </a:r>
+            <a:r>
+              <a:rPr lang="nl-NL" dirty="0" err="1"/>
+              <a:t>hallelujah</a:t>
+            </a:r>
+            <a:r>
+              <a:rPr lang="nl-NL" dirty="0"/>
+              <a:t>)</a:t>
+            </a:r>
+          </a:p>
+          <a:p>
+            <a:r>
+              <a:rPr lang="nl-NL" dirty="0"/>
+              <a:t>17:30 Docker 101</a:t>
+            </a:r>
+          </a:p>
+          <a:p>
+            <a:r>
+              <a:rPr lang="en-US" dirty="0"/>
+              <a:t>18:00 D</a:t>
+            </a:r>
+            <a:r>
+              <a:rPr lang="nl-NL" dirty="0" err="1"/>
+              <a:t>iner</a:t>
+            </a:r>
             <a:endParaRPr lang="nl-NL" dirty="0"/>
           </a:p>
-        </p:txBody>
-      </p:sp>
-      <p:sp>
-        <p:nvSpPr>
-          <p:cNvPr id="3" name="Content Placeholder 2"/>
-          <p:cNvSpPr>
-            <a:spLocks noGrp="1"/>
-          </p:cNvSpPr>
-          <p:nvPr>
-            <p:ph idx="1"/>
-          </p:nvPr>
-        </p:nvSpPr>
-        <p:spPr/>
-        <p:txBody>
-          <a:bodyPr/>
-          <a:lstStyle/>
-          <a:p>
-            <a:r>
-              <a:rPr lang="nl-NL" dirty="0" smtClean="0"/>
-              <a:t>Verwachtingen</a:t>
-            </a:r>
-          </a:p>
-          <a:p>
-            <a:r>
-              <a:rPr lang="nl-NL" dirty="0" smtClean="0"/>
-              <a:t>Introductie</a:t>
-            </a:r>
-          </a:p>
-          <a:p>
-            <a:r>
-              <a:rPr lang="nl-NL" dirty="0" smtClean="0"/>
-              <a:t>Microservices 101</a:t>
-            </a:r>
-          </a:p>
-          <a:p>
-            <a:r>
-              <a:rPr lang="nl-NL" dirty="0" err="1" smtClean="0"/>
-              <a:t>Docker</a:t>
-            </a:r>
-            <a:r>
-              <a:rPr lang="nl-NL" dirty="0" smtClean="0"/>
-              <a:t> 101</a:t>
-            </a:r>
-          </a:p>
-          <a:p>
-            <a:r>
-              <a:rPr lang="nl-NL" dirty="0" smtClean="0"/>
-              <a:t>Workshop </a:t>
-            </a:r>
-            <a:r>
-              <a:rPr lang="nl-NL" dirty="0" err="1" smtClean="0"/>
-              <a:t>Docker</a:t>
-            </a:r>
-            <a:r>
-              <a:rPr lang="nl-NL" dirty="0" smtClean="0"/>
-              <a:t> container (OSS)</a:t>
-            </a:r>
-          </a:p>
-          <a:p>
-            <a:r>
-              <a:rPr lang="nl-NL" dirty="0" smtClean="0"/>
-              <a:t>Afronding &amp; korte evaluatie</a:t>
-            </a:r>
-            <a:endParaRPr lang="nl-NL" dirty="0"/>
+          <a:p>
+            <a:r>
+              <a:rPr lang="en-US" dirty="0"/>
+              <a:t>1</a:t>
+            </a:r>
+            <a:r>
+              <a:rPr lang="nl-NL" dirty="0"/>
+              <a:t>8:30 Docker 101</a:t>
+            </a:r>
+          </a:p>
+          <a:p>
+            <a:r>
+              <a:rPr lang="nl-NL" dirty="0"/>
+              <a:t>19:00 Opdracht 1 container</a:t>
+            </a:r>
+          </a:p>
+          <a:p>
+            <a:r>
+              <a:rPr lang="nl-NL" dirty="0"/>
+              <a:t>20:15 Afronding &amp; korte evaluatie</a:t>
+            </a:r>
           </a:p>
         </p:txBody>
       </p:sp>
@@ -4733,7 +4763,7 @@
                 </a:solidFill>
               </a:rPr>
               <a:pPr/>
-              <a:t>14 november 2017</a:t>
+              <a:t>5 oktober 2018</a:t>
             </a:fld>
             <a:endParaRPr lang="nl-NL" sz="900" cap="all" dirty="0">
               <a:solidFill>
@@ -4782,6 +4812,42 @@
           </a:p>
         </p:txBody>
       </p:sp>
+      <p:pic>
+        <p:nvPicPr>
+          <p:cNvPr id="7" name="Picture 6">
+            <a:extLst>
+              <a:ext uri="{FF2B5EF4-FFF2-40B4-BE49-F238E27FC236}">
+                <a16:creationId xmlns:a16="http://schemas.microsoft.com/office/drawing/2014/main" id="{03EBDE02-4E48-49E4-A571-58C1DDDB9EB8}"/>
+              </a:ext>
+            </a:extLst>
+          </p:cNvPr>
+          <p:cNvPicPr>
+            <a:picLocks noChangeAspect="1"/>
+          </p:cNvPicPr>
+          <p:nvPr/>
+        </p:nvPicPr>
+        <p:blipFill>
+          <a:blip r:embed="rId3">
+            <a:extLst>
+              <a:ext uri="{28A0092B-C50C-407E-A947-70E740481C1C}">
+                <a14:useLocalDpi xmlns:a14="http://schemas.microsoft.com/office/drawing/2010/main" val="0"/>
+              </a:ext>
+            </a:extLst>
+          </a:blip>
+          <a:stretch>
+            <a:fillRect/>
+          </a:stretch>
+        </p:blipFill>
+        <p:spPr>
+          <a:xfrm>
+            <a:off x="5405324" y="3239911"/>
+            <a:ext cx="3375378" cy="2531534"/>
+          </a:xfrm>
+          <a:prstGeom prst="rect">
+            <a:avLst/>
+          </a:prstGeom>
+        </p:spPr>
+      </p:pic>
     </p:spTree>
     <p:extLst>
       <p:ext uri="{BB962C8B-B14F-4D97-AF65-F5344CB8AC3E}">
@@ -4792,13 +4858,6 @@
   <p:clrMapOvr>
     <a:masterClrMapping/>
   </p:clrMapOvr>
-  <p:timing>
-    <p:tnLst>
-      <p:par>
-        <p:cTn id="1" dur="indefinite" restart="never" nodeType="tmRoot"/>
-      </p:par>
-    </p:tnLst>
-  </p:timing>
 </p:sld>
 </file>
 
@@ -4835,74 +4894,91 @@
           <a:lstStyle/>
           <a:p>
             <a:r>
-              <a:rPr lang="nl-NL" dirty="0" smtClean="0"/>
+              <a:rPr lang="nl-NL" dirty="0"/>
               <a:t>Programma Dag 2</a:t>
             </a:r>
+          </a:p>
+        </p:txBody>
+      </p:sp>
+      <p:sp>
+        <p:nvSpPr>
+          <p:cNvPr id="3" name="Content Placeholder 2"/>
+          <p:cNvSpPr>
+            <a:spLocks noGrp="1"/>
+          </p:cNvSpPr>
+          <p:nvPr>
+            <p:ph idx="1"/>
+          </p:nvPr>
+        </p:nvSpPr>
+        <p:spPr/>
+        <p:txBody>
+          <a:bodyPr/>
+          <a:lstStyle/>
+          <a:p>
+            <a:r>
+              <a:rPr lang="nl-NL" dirty="0"/>
+              <a:t>16:00 </a:t>
+            </a:r>
+            <a:r>
+              <a:rPr lang="nl-NL" dirty="0" err="1"/>
+              <a:t>Recap</a:t>
+            </a:r>
+            <a:r>
+              <a:rPr lang="nl-NL" dirty="0"/>
+              <a:t> dag 1</a:t>
+            </a:r>
+          </a:p>
+          <a:p>
+            <a:r>
+              <a:rPr lang="nl-NL" dirty="0"/>
+              <a:t>16:15 Microservices 102 (realisme)</a:t>
+            </a:r>
+          </a:p>
+          <a:p>
+            <a:r>
+              <a:rPr lang="nl-NL" dirty="0"/>
+              <a:t>17:00 Docker 102</a:t>
+            </a:r>
+          </a:p>
+          <a:p>
+            <a:r>
+              <a:rPr lang="en-US" dirty="0"/>
+              <a:t>18:00 D</a:t>
+            </a:r>
+            <a:r>
+              <a:rPr lang="nl-NL" dirty="0" err="1"/>
+              <a:t>iner</a:t>
+            </a:r>
             <a:endParaRPr lang="nl-NL" dirty="0"/>
           </a:p>
-        </p:txBody>
-      </p:sp>
-      <p:sp>
-        <p:nvSpPr>
-          <p:cNvPr id="3" name="Content Placeholder 2"/>
-          <p:cNvSpPr>
-            <a:spLocks noGrp="1"/>
-          </p:cNvSpPr>
-          <p:nvPr>
-            <p:ph idx="1"/>
-          </p:nvPr>
-        </p:nvSpPr>
-        <p:spPr/>
-        <p:txBody>
-          <a:bodyPr/>
-          <a:lstStyle/>
-          <a:p>
-            <a:r>
-              <a:rPr lang="nl-NL" dirty="0" err="1" smtClean="0"/>
-              <a:t>Recap</a:t>
-            </a:r>
-            <a:r>
-              <a:rPr lang="nl-NL" dirty="0" smtClean="0"/>
-              <a:t> dag 1</a:t>
-            </a:r>
-          </a:p>
-          <a:p>
-            <a:r>
-              <a:rPr lang="nl-NL" dirty="0" smtClean="0"/>
-              <a:t>Microservices </a:t>
-            </a:r>
-            <a:r>
-              <a:rPr lang="nl-NL" dirty="0" smtClean="0"/>
-              <a:t>102</a:t>
-            </a:r>
-            <a:endParaRPr lang="nl-NL" dirty="0" smtClean="0"/>
-          </a:p>
-          <a:p>
-            <a:r>
-              <a:rPr lang="nl-NL" smtClean="0"/>
-              <a:t>Docker </a:t>
-            </a:r>
-            <a:r>
-              <a:rPr lang="nl-NL" smtClean="0"/>
-              <a:t>102</a:t>
-            </a:r>
-          </a:p>
-          <a:p>
-            <a:r>
-              <a:rPr lang="nl-NL" dirty="0" smtClean="0"/>
-              <a:t>(Real-life casus</a:t>
-            </a:r>
-            <a:r>
-              <a:rPr lang="nl-NL" dirty="0"/>
-              <a:t>)</a:t>
-            </a:r>
-            <a:endParaRPr lang="nl-NL" dirty="0"/>
-          </a:p>
-          <a:p>
-            <a:r>
-              <a:rPr lang="nl-NL" dirty="0" smtClean="0"/>
-              <a:t>Afronding &amp; korte evaluatie</a:t>
-            </a:r>
+          <a:p>
+            <a:r>
+              <a:rPr lang="nl-NL" dirty="0"/>
+              <a:t>18:30 </a:t>
+            </a:r>
+            <a:r>
+              <a:rPr lang="en-US" dirty="0"/>
+              <a:t>O</a:t>
+            </a:r>
+            <a:r>
+              <a:rPr lang="nl-NL" dirty="0" err="1"/>
+              <a:t>efening</a:t>
+            </a:r>
+            <a:r>
+              <a:rPr lang="nl-NL" dirty="0"/>
+              <a:t> 2 containers</a:t>
+            </a:r>
+          </a:p>
+          <a:p>
+            <a:r>
+              <a:rPr lang="nl-NL" dirty="0"/>
+              <a:t>20:15 Afronding &amp; korte evaluatie</a:t>
+            </a:r>
+          </a:p>
+          <a:p>
+            <a:pPr marL="0" indent="0">
+              <a:buNone/>
+            </a:pPr>
             <a:endParaRPr lang="nl-NL" dirty="0"/>
           </a:p>
         </p:txBody>
@@ -4929,7 +5005,7 @@
                 </a:solidFill>
               </a:rPr>
               <a:pPr/>
-              <a:t>14 november 2017</a:t>
+              <a:t>5 oktober 2018</a:t>
             </a:fld>
             <a:endParaRPr lang="nl-NL" sz="900" cap="all" dirty="0">
               <a:solidFill>
@@ -4978,6 +5054,42 @@
           </a:p>
         </p:txBody>
       </p:sp>
+      <p:pic>
+        <p:nvPicPr>
+          <p:cNvPr id="7" name="Picture 6">
+            <a:extLst>
+              <a:ext uri="{FF2B5EF4-FFF2-40B4-BE49-F238E27FC236}">
+                <a16:creationId xmlns:a16="http://schemas.microsoft.com/office/drawing/2014/main" id="{B7B8C290-7F04-4D52-A362-B785A7F698EA}"/>
+              </a:ext>
+            </a:extLst>
+          </p:cNvPr>
+          <p:cNvPicPr>
+            <a:picLocks noChangeAspect="1"/>
+          </p:cNvPicPr>
+          <p:nvPr/>
+        </p:nvPicPr>
+        <p:blipFill>
+          <a:blip r:embed="rId3">
+            <a:extLst>
+              <a:ext uri="{28A0092B-C50C-407E-A947-70E740481C1C}">
+                <a14:useLocalDpi xmlns:a14="http://schemas.microsoft.com/office/drawing/2010/main" val="0"/>
+              </a:ext>
+            </a:extLst>
+          </a:blip>
+          <a:stretch>
+            <a:fillRect/>
+          </a:stretch>
+        </p:blipFill>
+        <p:spPr>
+          <a:xfrm>
+            <a:off x="4718757" y="3557488"/>
+            <a:ext cx="4141261" cy="2328787"/>
+          </a:xfrm>
+          <a:prstGeom prst="rect">
+            <a:avLst/>
+          </a:prstGeom>
+        </p:spPr>
+      </p:pic>
     </p:spTree>
     <p:extLst>
       <p:ext uri="{BB962C8B-B14F-4D97-AF65-F5344CB8AC3E}">
@@ -4988,13 +5100,226 @@
   <p:clrMapOvr>
     <a:masterClrMapping/>
   </p:clrMapOvr>
-  <p:timing>
-    <p:tnLst>
-      <p:par>
-        <p:cTn id="1" dur="indefinite" restart="never" nodeType="tmRoot"/>
-      </p:par>
-    </p:tnLst>
-  </p:timing>
+</p:sld>
+</file>
+
+<file path=ppt/slides/slide6.xml><?xml version="1.0" encoding="utf-8"?>
+<p:sld xmlns:a="http://schemas.openxmlformats.org/drawingml/2006/main" xmlns:r="http://schemas.openxmlformats.org/officeDocument/2006/relationships" xmlns:p="http://schemas.openxmlformats.org/presentationml/2006/main">
+  <p:cSld>
+    <p:spTree>
+      <p:nvGrpSpPr>
+        <p:cNvPr id="1" name=""/>
+        <p:cNvGrpSpPr/>
+        <p:nvPr/>
+      </p:nvGrpSpPr>
+      <p:grpSpPr>
+        <a:xfrm>
+          <a:off x="0" y="0"/>
+          <a:ext cx="0" cy="0"/>
+          <a:chOff x="0" y="0"/>
+          <a:chExt cx="0" cy="0"/>
+        </a:xfrm>
+      </p:grpSpPr>
+      <p:sp>
+        <p:nvSpPr>
+          <p:cNvPr id="2" name="Title 1"/>
+          <p:cNvSpPr>
+            <a:spLocks noGrp="1"/>
+          </p:cNvSpPr>
+          <p:nvPr>
+            <p:ph type="title"/>
+          </p:nvPr>
+        </p:nvSpPr>
+        <p:spPr/>
+        <p:txBody>
+          <a:bodyPr/>
+          <a:lstStyle/>
+          <a:p>
+            <a:r>
+              <a:rPr lang="nl-NL" dirty="0"/>
+              <a:t>Programma Dag 3</a:t>
+            </a:r>
+          </a:p>
+        </p:txBody>
+      </p:sp>
+      <p:sp>
+        <p:nvSpPr>
+          <p:cNvPr id="3" name="Content Placeholder 2"/>
+          <p:cNvSpPr>
+            <a:spLocks noGrp="1"/>
+          </p:cNvSpPr>
+          <p:nvPr>
+            <p:ph idx="1"/>
+          </p:nvPr>
+        </p:nvSpPr>
+        <p:spPr/>
+        <p:txBody>
+          <a:bodyPr/>
+          <a:lstStyle/>
+          <a:p>
+            <a:r>
+              <a:rPr lang="nl-NL" dirty="0"/>
+              <a:t>16:00 </a:t>
+            </a:r>
+            <a:r>
+              <a:rPr lang="nl-NL" dirty="0" err="1"/>
+              <a:t>Recap</a:t>
+            </a:r>
+            <a:r>
+              <a:rPr lang="nl-NL" dirty="0"/>
+              <a:t> dag 2</a:t>
+            </a:r>
+          </a:p>
+          <a:p>
+            <a:r>
+              <a:rPr lang="nl-NL" dirty="0"/>
+              <a:t>16:15 Microservices 103 (mineur)</a:t>
+            </a:r>
+          </a:p>
+          <a:p>
+            <a:r>
+              <a:rPr lang="nl-NL" dirty="0"/>
+              <a:t>17:00 Docker 103</a:t>
+            </a:r>
+          </a:p>
+          <a:p>
+            <a:r>
+              <a:rPr lang="en-US" dirty="0"/>
+              <a:t>18:00 Diner</a:t>
+            </a:r>
+            <a:endParaRPr lang="nl-NL" dirty="0"/>
+          </a:p>
+          <a:p>
+            <a:r>
+              <a:rPr lang="nl-NL" dirty="0"/>
+              <a:t>18:30 Real-life casus</a:t>
+            </a:r>
+          </a:p>
+          <a:p>
+            <a:r>
+              <a:rPr lang="nl-NL" dirty="0"/>
+              <a:t>20:15 Afronding &amp; korte evaluatie</a:t>
+            </a:r>
+          </a:p>
+        </p:txBody>
+      </p:sp>
+      <p:sp>
+        <p:nvSpPr>
+          <p:cNvPr id="4" name="Date Placeholder 3"/>
+          <p:cNvSpPr>
+            <a:spLocks noGrp="1"/>
+          </p:cNvSpPr>
+          <p:nvPr>
+            <p:ph type="dt" sz="half" idx="10"/>
+          </p:nvPr>
+        </p:nvSpPr>
+        <p:spPr/>
+        <p:txBody>
+          <a:bodyPr/>
+          <a:lstStyle/>
+          <a:p>
+            <a:fld id="{E12810C8-78A9-4DEF-891A-0144BA015F7E}" type="datetime4">
+              <a:rPr lang="nl-NL" sz="900" cap="all">
+                <a:solidFill>
+                  <a:srgbClr val="009036"/>
+                </a:solidFill>
+              </a:rPr>
+              <a:pPr/>
+              <a:t>5 oktober 2018</a:t>
+            </a:fld>
+            <a:endParaRPr lang="nl-NL" sz="900" cap="all" dirty="0">
+              <a:solidFill>
+                <a:srgbClr val="009036"/>
+              </a:solidFill>
+            </a:endParaRPr>
+          </a:p>
+        </p:txBody>
+      </p:sp>
+      <p:sp>
+        <p:nvSpPr>
+          <p:cNvPr id="5" name="Footer Placeholder 4"/>
+          <p:cNvSpPr>
+            <a:spLocks noGrp="1"/>
+          </p:cNvSpPr>
+          <p:nvPr>
+            <p:ph type="ftr" sz="quarter" idx="11"/>
+          </p:nvPr>
+        </p:nvSpPr>
+        <p:spPr/>
+        <p:txBody>
+          <a:bodyPr/>
+          <a:lstStyle/>
+          <a:p>
+            <a:r>
+              <a:rPr lang="nl-NL" dirty="0">
+                <a:solidFill>
+                  <a:srgbClr val="009036"/>
+                </a:solidFill>
+              </a:rPr>
+              <a:t>Johannes Sim &amp; Renzo </a:t>
+            </a:r>
+            <a:r>
+              <a:rPr lang="nl-NL" dirty="0" err="1">
+                <a:solidFill>
+                  <a:srgbClr val="009036"/>
+                </a:solidFill>
+              </a:rPr>
+              <a:t>veldkamp</a:t>
+            </a:r>
+            <a:endParaRPr lang="nl-NL" dirty="0">
+              <a:solidFill>
+                <a:srgbClr val="009036"/>
+              </a:solidFill>
+            </a:endParaRPr>
+          </a:p>
+        </p:txBody>
+      </p:sp>
+      <p:pic>
+        <p:nvPicPr>
+          <p:cNvPr id="7" name="Picture 6">
+            <a:extLst>
+              <a:ext uri="{FF2B5EF4-FFF2-40B4-BE49-F238E27FC236}">
+                <a16:creationId xmlns:a16="http://schemas.microsoft.com/office/drawing/2014/main" id="{8B239A10-FC7D-42BF-9E83-744BA0BE71CC}"/>
+              </a:ext>
+            </a:extLst>
+          </p:cNvPr>
+          <p:cNvPicPr>
+            <a:picLocks noChangeAspect="1"/>
+          </p:cNvPicPr>
+          <p:nvPr/>
+        </p:nvPicPr>
+        <p:blipFill>
+          <a:blip r:embed="rId3">
+            <a:extLst>
+              <a:ext uri="{28A0092B-C50C-407E-A947-70E740481C1C}">
+                <a14:useLocalDpi xmlns:a14="http://schemas.microsoft.com/office/drawing/2010/main" val="0"/>
+              </a:ext>
+            </a:extLst>
+          </a:blip>
+          <a:stretch>
+            <a:fillRect/>
+          </a:stretch>
+        </p:blipFill>
+        <p:spPr>
+          <a:xfrm>
+            <a:off x="2634670" y="3050421"/>
+            <a:ext cx="6146032" cy="3212698"/>
+          </a:xfrm>
+          <a:prstGeom prst="rect">
+            <a:avLst/>
+          </a:prstGeom>
+        </p:spPr>
+      </p:pic>
+    </p:spTree>
+    <p:extLst>
+      <p:ext uri="{BB962C8B-B14F-4D97-AF65-F5344CB8AC3E}">
+        <p14:creationId xmlns:p14="http://schemas.microsoft.com/office/powerpoint/2010/main" val="1188636396"/>
+      </p:ext>
+    </p:extLst>
+  </p:cSld>
+  <p:clrMapOvr>
+    <a:masterClrMapping/>
+  </p:clrMapOvr>
 </p:sld>
 </file>
 
@@ -5889,21 +6214,6 @@
 </file>
 
 <file path=customXml/item1.xml><?xml version="1.0" encoding="utf-8"?>
-<?mso-contentType ?>
-<FormTemplates xmlns="http://schemas.microsoft.com/sharepoint/v3/contenttype/forms">
-  <Display>DocumentLibraryForm</Display>
-  <Edit>DocumentLibraryForm</Edit>
-  <New>DocumentLibraryForm</New>
-</FormTemplates>
-</file>
-
-<file path=customXml/item2.xml><?xml version="1.0" encoding="utf-8"?>
-<p:properties xmlns:p="http://schemas.microsoft.com/office/2006/metadata/properties" xmlns:xsi="http://www.w3.org/2001/XMLSchema-instance" xmlns:pc="http://schemas.microsoft.com/office/infopath/2007/PartnerControls">
-  <documentManagement/>
-</p:properties>
-</file>
-
-<file path=customXml/item3.xml><?xml version="1.0" encoding="utf-8"?>
 <ct:contentTypeSchema xmlns:ct="http://schemas.microsoft.com/office/2006/metadata/contentType" xmlns:ma="http://schemas.microsoft.com/office/2006/metadata/properties/metaAttributes" ct:_="" ma:_="" ma:contentTypeName="Document" ma:contentTypeID="0x0101009843F10021B1B74BA5DD583B6999787F" ma:contentTypeVersion="1" ma:contentTypeDescription="Een nieuw document maken." ma:contentTypeScope="" ma:versionID="9f7dad7ca3b37095ed9229a6a072267d">
   <xsd:schema xmlns:xsd="http://www.w3.org/2001/XMLSchema" xmlns:xs="http://www.w3.org/2001/XMLSchema" xmlns:p="http://schemas.microsoft.com/office/2006/metadata/properties" targetNamespace="http://schemas.microsoft.com/office/2006/metadata/properties" ma:root="true" ma:fieldsID="a17e5968c79d9fe2fc9f8835eee23f58">
     <xsd:element name="properties">
@@ -6017,30 +6327,22 @@
 </ct:contentTypeSchema>
 </file>
 
-<file path=customXml/itemProps1.xml><?xml version="1.0" encoding="utf-8"?>
-<ds:datastoreItem xmlns:ds="http://schemas.openxmlformats.org/officeDocument/2006/customXml" ds:itemID="{4A752D92-0ACC-48D2-A658-AB744FE70ECE}">
-  <ds:schemaRefs>
-    <ds:schemaRef ds:uri="http://schemas.microsoft.com/sharepoint/v3/contenttype/forms"/>
-  </ds:schemaRefs>
-</ds:datastoreItem>
+<file path=customXml/item2.xml><?xml version="1.0" encoding="utf-8"?>
+<p:properties xmlns:p="http://schemas.microsoft.com/office/2006/metadata/properties" xmlns:xsi="http://www.w3.org/2001/XMLSchema-instance" xmlns:pc="http://schemas.microsoft.com/office/infopath/2007/PartnerControls">
+  <documentManagement/>
+</p:properties>
 </file>
 
-<file path=customXml/itemProps2.xml><?xml version="1.0" encoding="utf-8"?>
-<ds:datastoreItem xmlns:ds="http://schemas.openxmlformats.org/officeDocument/2006/customXml" ds:itemID="{DE0A3E1F-B2EC-4B36-9F71-3169FFDE4AE0}">
-  <ds:schemaRefs>
-    <ds:schemaRef ds:uri="http://purl.org/dc/elements/1.1/"/>
-    <ds:schemaRef ds:uri="http://schemas.microsoft.com/office/2006/metadata/properties"/>
-    <ds:schemaRef ds:uri="http://schemas.microsoft.com/office/2006/documentManagement/types"/>
-    <ds:schemaRef ds:uri="http://purl.org/dc/terms/"/>
-    <ds:schemaRef ds:uri="http://schemas.openxmlformats.org/package/2006/metadata/core-properties"/>
-    <ds:schemaRef ds:uri="http://purl.org/dc/dcmitype/"/>
-    <ds:schemaRef ds:uri="http://schemas.microsoft.com/office/infopath/2007/PartnerControls"/>
-    <ds:schemaRef ds:uri="http://www.w3.org/XML/1998/namespace"/>
-  </ds:schemaRefs>
-</ds:datastoreItem>
+<file path=customXml/item3.xml><?xml version="1.0" encoding="utf-8"?>
+<?mso-contentType ?>
+<FormTemplates xmlns="http://schemas.microsoft.com/sharepoint/v3/contenttype/forms">
+  <Display>DocumentLibraryForm</Display>
+  <Edit>DocumentLibraryForm</Edit>
+  <New>DocumentLibraryForm</New>
+</FormTemplates>
 </file>
 
-<file path=customXml/itemProps3.xml><?xml version="1.0" encoding="utf-8"?>
+<file path=customXml/itemProps1.xml><?xml version="1.0" encoding="utf-8"?>
 <ds:datastoreItem xmlns:ds="http://schemas.openxmlformats.org/officeDocument/2006/customXml" ds:itemID="{3175F035-B069-4F0E-ADC8-454931FDE34D}">
   <ds:schemaRefs>
     <ds:schemaRef ds:uri="http://schemas.microsoft.com/office/2006/metadata/contentType"/>
@@ -6054,4 +6356,27 @@
     <ds:schemaRef ds:uri="http://schemas.microsoft.com/office/infopath/2007/PartnerControls"/>
   </ds:schemaRefs>
 </ds:datastoreItem>
+</file>
+
+<file path=customXml/itemProps2.xml><?xml version="1.0" encoding="utf-8"?>
+<ds:datastoreItem xmlns:ds="http://schemas.openxmlformats.org/officeDocument/2006/customXml" ds:itemID="{DE0A3E1F-B2EC-4B36-9F71-3169FFDE4AE0}">
+  <ds:schemaRefs>
+    <ds:schemaRef ds:uri="http://purl.org/dc/terms/"/>
+    <ds:schemaRef ds:uri="http://schemas.openxmlformats.org/package/2006/metadata/core-properties"/>
+    <ds:schemaRef ds:uri="http://purl.org/dc/dcmitype/"/>
+    <ds:schemaRef ds:uri="http://schemas.microsoft.com/office/infopath/2007/PartnerControls"/>
+    <ds:schemaRef ds:uri="http://schemas.microsoft.com/office/2006/documentManagement/types"/>
+    <ds:schemaRef ds:uri="http://purl.org/dc/elements/1.1/"/>
+    <ds:schemaRef ds:uri="http://schemas.microsoft.com/office/2006/metadata/properties"/>
+    <ds:schemaRef ds:uri="http://www.w3.org/XML/1998/namespace"/>
+  </ds:schemaRefs>
+</ds:datastoreItem>
+</file>
+
+<file path=customXml/itemProps3.xml><?xml version="1.0" encoding="utf-8"?>
+<ds:datastoreItem xmlns:ds="http://schemas.openxmlformats.org/officeDocument/2006/customXml" ds:itemID="{4A752D92-0ACC-48D2-A658-AB744FE70ECE}">
+  <ds:schemaRefs>
+    <ds:schemaRef ds:uri="http://schemas.microsoft.com/sharepoint/v3/contenttype/forms"/>
+  </ds:schemaRefs>
+</ds:datastoreItem>
 </file>
</xml_diff>

<commit_message>
updated progr. and leerdoelen
</commit_message>
<xml_diff>
--- a/Presentatie/Programma en Leerdoelen.pptx
+++ b/Presentatie/Programma en Leerdoelen.pptx
@@ -229,7 +229,7 @@
           <a:p>
             <a:fld id="{4FDA5BBF-9A9E-E34C-87D2-CD6D1CA60245}" type="datetime1">
               <a:rPr lang="en-US" smtClean="0"/>
-              <a:t>10/17/2018</a:t>
+              <a:t>11/2/2018</a:t>
             </a:fld>
             <a:endParaRPr lang="en-US" dirty="0"/>
           </a:p>
@@ -395,7 +395,7 @@
           <a:p>
             <a:fld id="{FE5FB5CF-D153-1544-8329-2FC1F4ABF24D}" type="datetime1">
               <a:rPr lang="en-US" smtClean="0"/>
-              <a:t>10/17/2018</a:t>
+              <a:t>11/2/2018</a:t>
             </a:fld>
             <a:endParaRPr lang="nl-NL" dirty="0"/>
           </a:p>
@@ -1398,7 +1398,7 @@
           <a:p>
             <a:fld id="{69E2E37C-AA1E-43B2-B213-E688D587CE49}" type="datetime4">
               <a:rPr lang="nl-NL" smtClean="0"/>
-              <a:t>17 oktober 2018</a:t>
+              <a:t>2 november 2018</a:t>
             </a:fld>
             <a:endParaRPr lang="nl-NL" dirty="0"/>
           </a:p>
@@ -1515,7 +1515,7 @@
           <a:p>
             <a:fld id="{96BF97C2-7262-427C-9F3E-B0D6D33F54E2}" type="datetime4">
               <a:rPr lang="nl-NL" smtClean="0"/>
-              <a:t>17 oktober 2018</a:t>
+              <a:t>2 november 2018</a:t>
             </a:fld>
             <a:endParaRPr lang="nl-NL" dirty="0"/>
           </a:p>
@@ -1739,7 +1739,7 @@
           <a:p>
             <a:fld id="{AB63B3A2-628B-479E-BF05-5959017C6A02}" type="datetime4">
               <a:rPr lang="nl-NL" smtClean="0"/>
-              <a:t>17 oktober 2018</a:t>
+              <a:t>2 november 2018</a:t>
             </a:fld>
             <a:endParaRPr lang="nl-NL" dirty="0"/>
           </a:p>
@@ -2006,7 +2006,7 @@
             <a:fld id="{249B52C1-75DC-496B-AF3F-4978B95BB865}" type="datetime4">
               <a:rPr lang="nl-NL" smtClean="0"/>
               <a:pPr/>
-              <a:t>17 oktober 2018</a:t>
+              <a:t>2 november 2018</a:t>
             </a:fld>
             <a:endParaRPr lang="nl-NL" dirty="0"/>
           </a:p>
@@ -2102,7 +2102,7 @@
           <a:p>
             <a:fld id="{8D31B592-DB5E-43FC-B016-67E26C01643F}" type="datetime4">
               <a:rPr lang="nl-NL" smtClean="0"/>
-              <a:t>17 oktober 2018</a:t>
+              <a:t>2 november 2018</a:t>
             </a:fld>
             <a:endParaRPr lang="nl-NL" dirty="0"/>
           </a:p>
@@ -2312,7 +2312,7 @@
           <a:p>
             <a:fld id="{92E94904-3BB7-4874-AB8B-F31F00F8A078}" type="datetime4">
               <a:rPr lang="nl-NL" smtClean="0"/>
-              <a:t>17 oktober 2018</a:t>
+              <a:t>2 november 2018</a:t>
             </a:fld>
             <a:endParaRPr lang="nl-NL" dirty="0"/>
           </a:p>
@@ -2493,7 +2493,7 @@
           <a:p>
             <a:fld id="{A9642D5E-8E53-4D94-8479-CCF9387ED904}" type="datetime4">
               <a:rPr lang="nl-NL" smtClean="0"/>
-              <a:t>17 oktober 2018</a:t>
+              <a:t>2 november 2018</a:t>
             </a:fld>
             <a:endParaRPr lang="nl-NL" dirty="0"/>
           </a:p>
@@ -2708,7 +2708,7 @@
           <a:p>
             <a:fld id="{87D76D0B-AA25-481F-9FCE-BD155C5A6085}" type="datetime4">
               <a:rPr lang="nl-NL" smtClean="0"/>
-              <a:t>17 oktober 2018</a:t>
+              <a:t>2 november 2018</a:t>
             </a:fld>
             <a:endParaRPr lang="nl-NL" dirty="0"/>
           </a:p>
@@ -2920,7 +2920,7 @@
           <a:p>
             <a:fld id="{88C11819-B839-4C27-8B45-7170CEF46D62}" type="datetime4">
               <a:rPr lang="nl-NL" smtClean="0"/>
-              <a:t>17 oktober 2018</a:t>
+              <a:t>2 november 2018</a:t>
             </a:fld>
             <a:endParaRPr lang="nl-NL" dirty="0"/>
           </a:p>
@@ -3135,7 +3135,7 @@
           <a:p>
             <a:fld id="{174613E7-29CA-4C1D-88BD-FA51696C19FE}" type="datetime4">
               <a:rPr lang="nl-NL" smtClean="0"/>
-              <a:t>17 oktober 2018</a:t>
+              <a:t>2 november 2018</a:t>
             </a:fld>
             <a:endParaRPr lang="nl-NL" dirty="0"/>
           </a:p>
@@ -3328,7 +3328,7 @@
           <a:p>
             <a:fld id="{9F389A9C-5452-4AF4-8D69-2209042ED2AB}" type="datetime4">
               <a:rPr lang="nl-NL" smtClean="0"/>
-              <a:t>17 oktober 2018</a:t>
+              <a:t>2 november 2018</a:t>
             </a:fld>
             <a:endParaRPr lang="nl-NL" dirty="0"/>
           </a:p>
@@ -3532,7 +3532,7 @@
           <a:p>
             <a:fld id="{59ABBC3E-A20C-4DEE-9D7A-437B797B148A}" type="datetime4">
               <a:rPr lang="nl-NL" smtClean="0"/>
-              <a:t>17 oktober 2018</a:t>
+              <a:t>2 november 2018</a:t>
             </a:fld>
             <a:r>
               <a:rPr lang="en-US"/>
@@ -4064,7 +4064,7 @@
           <a:p>
             <a:fld id="{E8809DAD-F941-4A15-ABB1-44FA32742BE9}" type="datetime4">
               <a:rPr lang="nl-NL" smtClean="0"/>
-              <a:t>17 oktober 2018</a:t>
+              <a:t>2 november 2018</a:t>
             </a:fld>
             <a:endParaRPr lang="nl-NL" dirty="0"/>
           </a:p>
@@ -4246,7 +4246,7 @@
                   <a:srgbClr val="009036"/>
                 </a:solidFill>
               </a:rPr>
-              <a:t>17 oktober 2018</a:t>
+              <a:t>2 november 2018</a:t>
             </a:fld>
             <a:endParaRPr lang="nl-NL" sz="900" cap="all" dirty="0">
               <a:solidFill>
@@ -4480,7 +4480,7 @@
                 </a:solidFill>
               </a:rPr>
               <a:pPr/>
-              <a:t>17 oktober 2018</a:t>
+              <a:t>2 november 2018</a:t>
             </a:fld>
             <a:endParaRPr lang="nl-NL" sz="900" cap="all" dirty="0">
               <a:solidFill>
@@ -4674,16 +4674,16 @@
               <a:t>18:30 </a:t>
             </a:r>
             <a:r>
+              <a:rPr lang="en-US" dirty="0" err="1"/>
+              <a:t>Oefeningen</a:t>
+            </a:r>
+            <a:r>
               <a:rPr lang="en-US" dirty="0"/>
-              <a:t>O</a:t>
-            </a:r>
-            <a:r>
-              <a:rPr lang="nl-NL" dirty="0" err="1"/>
-              <a:t>efening</a:t>
-            </a:r>
-            <a:r>
-              <a:rPr lang="nl-NL" dirty="0"/>
-              <a:t> meerdere containers</a:t>
+              <a:t> / Docker 102</a:t>
+            </a:r>
+            <a:r>
+              <a:rPr lang="nl-NL" dirty="0"/>
+              <a:t> (meerdere containers)</a:t>
             </a:r>
           </a:p>
           <a:p>
@@ -4722,7 +4722,7 @@
                 </a:solidFill>
               </a:rPr>
               <a:pPr/>
-              <a:t>17 oktober 2018</a:t>
+              <a:t>2 november 2018</a:t>
             </a:fld>
             <a:endParaRPr lang="nl-NL" sz="900" cap="all" dirty="0">
               <a:solidFill>
@@ -4904,12 +4904,26 @@
               <a:rPr lang="en-US" dirty="0"/>
               <a:t>18:00 Diner</a:t>
             </a:r>
+          </a:p>
+          <a:p>
+            <a:r>
+              <a:rPr lang="en-US" dirty="0"/>
+              <a:t>18:30 </a:t>
+            </a:r>
+            <a:r>
+              <a:rPr lang="en-US" dirty="0" err="1"/>
+              <a:t>Oefeningen</a:t>
+            </a:r>
+            <a:r>
+              <a:rPr lang="en-US" dirty="0"/>
+              <a:t> / Docker 103</a:t>
+            </a:r>
             <a:endParaRPr lang="nl-NL" dirty="0"/>
           </a:p>
           <a:p>
             <a:r>
               <a:rPr lang="nl-NL" dirty="0"/>
-              <a:t>18:30 Real-life casus</a:t>
+              <a:t>19:45 Real-life casus</a:t>
             </a:r>
           </a:p>
           <a:p>
@@ -4942,7 +4956,7 @@
                 </a:solidFill>
               </a:rPr>
               <a:pPr/>
-              <a:t>17 oktober 2018</a:t>
+              <a:t>2 november 2018</a:t>
             </a:fld>
             <a:endParaRPr lang="nl-NL" sz="900" cap="all" dirty="0">
               <a:solidFill>
@@ -5019,7 +5033,7 @@
         </p:blipFill>
         <p:spPr>
           <a:xfrm>
-            <a:off x="2634670" y="3050421"/>
+            <a:off x="2634670" y="3334199"/>
             <a:ext cx="6146032" cy="3212698"/>
           </a:xfrm>
           <a:prstGeom prst="rect">
@@ -5264,7 +5278,7 @@
                   <a:srgbClr val="009036"/>
                 </a:solidFill>
               </a:rPr>
-              <a:t>17 oktober 2018</a:t>
+              <a:t>2 november 2018</a:t>
             </a:fld>
             <a:endParaRPr lang="nl-NL" sz="900" cap="all" dirty="0">
               <a:solidFill>
@@ -6208,6 +6222,21 @@
 </file>
 
 <file path=customXml/item1.xml><?xml version="1.0" encoding="utf-8"?>
+<?mso-contentType ?>
+<FormTemplates xmlns="http://schemas.microsoft.com/sharepoint/v3/contenttype/forms">
+  <Display>DocumentLibraryForm</Display>
+  <Edit>DocumentLibraryForm</Edit>
+  <New>DocumentLibraryForm</New>
+</FormTemplates>
+</file>
+
+<file path=customXml/item2.xml><?xml version="1.0" encoding="utf-8"?>
+<p:properties xmlns:p="http://schemas.microsoft.com/office/2006/metadata/properties" xmlns:xsi="http://www.w3.org/2001/XMLSchema-instance" xmlns:pc="http://schemas.microsoft.com/office/infopath/2007/PartnerControls">
+  <documentManagement/>
+</p:properties>
+</file>
+
+<file path=customXml/item3.xml><?xml version="1.0" encoding="utf-8"?>
 <ct:contentTypeSchema xmlns:ct="http://schemas.microsoft.com/office/2006/metadata/contentType" xmlns:ma="http://schemas.microsoft.com/office/2006/metadata/properties/metaAttributes" ct:_="" ma:_="" ma:contentTypeName="Document" ma:contentTypeID="0x0101009843F10021B1B74BA5DD583B6999787F" ma:contentTypeVersion="1" ma:contentTypeDescription="Een nieuw document maken." ma:contentTypeScope="" ma:versionID="9f7dad7ca3b37095ed9229a6a072267d">
   <xsd:schema xmlns:xsd="http://www.w3.org/2001/XMLSchema" xmlns:xs="http://www.w3.org/2001/XMLSchema" xmlns:p="http://schemas.microsoft.com/office/2006/metadata/properties" targetNamespace="http://schemas.microsoft.com/office/2006/metadata/properties" ma:root="true" ma:fieldsID="a17e5968c79d9fe2fc9f8835eee23f58">
     <xsd:element name="properties">
@@ -6321,33 +6350,10 @@
 </ct:contentTypeSchema>
 </file>
 
-<file path=customXml/item2.xml><?xml version="1.0" encoding="utf-8"?>
-<p:properties xmlns:p="http://schemas.microsoft.com/office/2006/metadata/properties" xmlns:xsi="http://www.w3.org/2001/XMLSchema-instance" xmlns:pc="http://schemas.microsoft.com/office/infopath/2007/PartnerControls">
-  <documentManagement/>
-</p:properties>
-</file>
-
-<file path=customXml/item3.xml><?xml version="1.0" encoding="utf-8"?>
-<?mso-contentType ?>
-<FormTemplates xmlns="http://schemas.microsoft.com/sharepoint/v3/contenttype/forms">
-  <Display>DocumentLibraryForm</Display>
-  <Edit>DocumentLibraryForm</Edit>
-  <New>DocumentLibraryForm</New>
-</FormTemplates>
-</file>
-
 <file path=customXml/itemProps1.xml><?xml version="1.0" encoding="utf-8"?>
-<ds:datastoreItem xmlns:ds="http://schemas.openxmlformats.org/officeDocument/2006/customXml" ds:itemID="{3175F035-B069-4F0E-ADC8-454931FDE34D}">
+<ds:datastoreItem xmlns:ds="http://schemas.openxmlformats.org/officeDocument/2006/customXml" ds:itemID="{4A752D92-0ACC-48D2-A658-AB744FE70ECE}">
   <ds:schemaRefs>
-    <ds:schemaRef ds:uri="http://schemas.microsoft.com/office/2006/metadata/contentType"/>
-    <ds:schemaRef ds:uri="http://schemas.microsoft.com/office/2006/metadata/properties/metaAttributes"/>
-    <ds:schemaRef ds:uri="http://www.w3.org/2001/XMLSchema"/>
-    <ds:schemaRef ds:uri="http://schemas.microsoft.com/office/2006/metadata/properties"/>
-    <ds:schemaRef ds:uri="http://schemas.openxmlformats.org/package/2006/metadata/core-properties"/>
-    <ds:schemaRef ds:uri="http://purl.org/dc/elements/1.1/"/>
-    <ds:schemaRef ds:uri="http://purl.org/dc/terms/"/>
-    <ds:schemaRef ds:uri="http://schemas.microsoft.com/internal/obd"/>
-    <ds:schemaRef ds:uri="http://schemas.microsoft.com/office/infopath/2007/PartnerControls"/>
+    <ds:schemaRef ds:uri="http://schemas.microsoft.com/sharepoint/v3/contenttype/forms"/>
   </ds:schemaRefs>
 </ds:datastoreItem>
 </file>
@@ -6368,9 +6374,17 @@
 </file>
 
 <file path=customXml/itemProps3.xml><?xml version="1.0" encoding="utf-8"?>
-<ds:datastoreItem xmlns:ds="http://schemas.openxmlformats.org/officeDocument/2006/customXml" ds:itemID="{4A752D92-0ACC-48D2-A658-AB744FE70ECE}">
+<ds:datastoreItem xmlns:ds="http://schemas.openxmlformats.org/officeDocument/2006/customXml" ds:itemID="{3175F035-B069-4F0E-ADC8-454931FDE34D}">
   <ds:schemaRefs>
-    <ds:schemaRef ds:uri="http://schemas.microsoft.com/sharepoint/v3/contenttype/forms"/>
+    <ds:schemaRef ds:uri="http://schemas.microsoft.com/office/2006/metadata/contentType"/>
+    <ds:schemaRef ds:uri="http://schemas.microsoft.com/office/2006/metadata/properties/metaAttributes"/>
+    <ds:schemaRef ds:uri="http://www.w3.org/2001/XMLSchema"/>
+    <ds:schemaRef ds:uri="http://schemas.microsoft.com/office/2006/metadata/properties"/>
+    <ds:schemaRef ds:uri="http://schemas.openxmlformats.org/package/2006/metadata/core-properties"/>
+    <ds:schemaRef ds:uri="http://purl.org/dc/elements/1.1/"/>
+    <ds:schemaRef ds:uri="http://purl.org/dc/terms/"/>
+    <ds:schemaRef ds:uri="http://schemas.microsoft.com/internal/obd"/>
+    <ds:schemaRef ds:uri="http://schemas.microsoft.com/office/infopath/2007/PartnerControls"/>
   </ds:schemaRefs>
 </ds:datastoreItem>
 </file>
</xml_diff>